<commit_message>
shuffled the slides to make more sense
</commit_message>
<xml_diff>
--- a/legacy-code/scotlandjs version.pptx
+++ b/legacy-code/scotlandjs version.pptx
@@ -19,12 +19,12 @@
     <p:sldId id="372" r:id="rId10"/>
     <p:sldId id="373" r:id="rId11"/>
     <p:sldId id="374" r:id="rId12"/>
-    <p:sldId id="375" r:id="rId13"/>
-    <p:sldId id="376" r:id="rId14"/>
-    <p:sldId id="377" r:id="rId15"/>
-    <p:sldId id="378" r:id="rId16"/>
-    <p:sldId id="379" r:id="rId17"/>
-    <p:sldId id="380" r:id="rId18"/>
+    <p:sldId id="380" r:id="rId13"/>
+    <p:sldId id="375" r:id="rId14"/>
+    <p:sldId id="376" r:id="rId15"/>
+    <p:sldId id="377" r:id="rId16"/>
+    <p:sldId id="378" r:id="rId17"/>
+    <p:sldId id="379" r:id="rId18"/>
     <p:sldId id="381" r:id="rId19"/>
     <p:sldId id="382" r:id="rId20"/>
     <p:sldId id="383" r:id="rId21"/>
@@ -3855,11 +3855,11 @@
         </c:dLbls>
         <c:marker val="1"/>
         <c:smooth val="0"/>
-        <c:axId val="2065127352"/>
-        <c:axId val="2065139272"/>
+        <c:axId val="2110239816"/>
+        <c:axId val="2109610120"/>
       </c:lineChart>
       <c:dateAx>
-        <c:axId val="2065127352"/>
+        <c:axId val="2110239816"/>
         <c:scaling>
           <c:orientation val="minMax"/>
         </c:scaling>
@@ -3890,7 +3890,7 @@
             <a:endParaRPr lang="en-US"/>
           </a:p>
         </c:txPr>
-        <c:crossAx val="2065139272"/>
+        <c:crossAx val="2109610120"/>
         <c:crosses val="autoZero"/>
         <c:auto val="0"/>
         <c:lblOffset val="100"/>
@@ -3901,7 +3901,7 @@
         <c:minorTimeUnit val="days"/>
       </c:dateAx>
       <c:valAx>
-        <c:axId val="2065139272"/>
+        <c:axId val="2109610120"/>
         <c:scaling>
           <c:orientation val="minMax"/>
           <c:max val="20000.0"/>
@@ -3988,7 +3988,7 @@
             <a:endParaRPr lang="en-US"/>
           </a:p>
         </c:txPr>
-        <c:crossAx val="2065127352"/>
+        <c:crossAx val="2110239816"/>
         <c:crosses val="autoZero"/>
         <c:crossBetween val="between"/>
         <c:majorUnit val="4000.0"/>
@@ -5061,6 +5061,282 @@
             <p:ph type="sldImg"/>
           </p:nvPr>
         </p:nvSpPr>
+        <p:spPr>
+          <a:xfrm>
+            <a:off x="303213" y="685800"/>
+            <a:ext cx="6251575" cy="3429000"/>
+          </a:xfrm>
+        </p:spPr>
+      </p:sp>
+      <p:sp>
+        <p:nvSpPr>
+          <p:cNvPr id="3" name="Notes Placeholder 2"/>
+          <p:cNvSpPr>
+            <a:spLocks noGrp="1"/>
+          </p:cNvSpPr>
+          <p:nvPr>
+            <p:ph type="body" idx="1"/>
+          </p:nvPr>
+        </p:nvSpPr>
+        <p:spPr/>
+        <p:txBody>
+          <a:bodyPr>
+            <a:normAutofit/>
+          </a:bodyPr>
+          <a:lstStyle/>
+          <a:p>
+            <a:pPr marL="285750" indent="-285750">
+              <a:buFont typeface="Arial"/>
+              <a:buChar char="•"/>
+            </a:pPr>
+            <a:r>
+              <a:rPr lang="en-US" sz="900" dirty="0" smtClean="0"/>
+              <a:t>Fork</a:t>
+            </a:r>
+            <a:r>
+              <a:rPr lang="en-US" sz="900" baseline="0" dirty="0" smtClean="0"/>
+              <a:t> the tests</a:t>
+            </a:r>
+          </a:p>
+          <a:p>
+            <a:pPr marL="285750" indent="-285750">
+              <a:buFont typeface="Arial"/>
+              <a:buChar char="•"/>
+            </a:pPr>
+            <a:endParaRPr lang="en-US" sz="900" baseline="0" dirty="0" smtClean="0"/>
+          </a:p>
+          <a:p>
+            <a:pPr marL="285750" indent="-285750">
+              <a:buFont typeface="Arial"/>
+              <a:buChar char="•"/>
+            </a:pPr>
+            <a:r>
+              <a:rPr lang="en-US" sz="900" baseline="0" dirty="0" smtClean="0"/>
+              <a:t>Both old and new should be under test</a:t>
+            </a:r>
+          </a:p>
+          <a:p>
+            <a:pPr marL="285750" indent="-285750">
+              <a:buFont typeface="Arial"/>
+              <a:buChar char="•"/>
+            </a:pPr>
+            <a:endParaRPr lang="en-US" sz="900" baseline="0" dirty="0" smtClean="0"/>
+          </a:p>
+          <a:p>
+            <a:pPr marL="285750" indent="-285750">
+              <a:buFont typeface="Arial"/>
+              <a:buChar char="•"/>
+            </a:pPr>
+            <a:r>
+              <a:rPr lang="en-US" sz="900" baseline="0" dirty="0" smtClean="0"/>
+              <a:t>Over the last two years we’ve gotten to 70% coverage – 5781 tests</a:t>
+            </a:r>
+          </a:p>
+          <a:p>
+            <a:pPr marL="285750" indent="-285750">
+              <a:buFont typeface="Arial"/>
+              <a:buChar char="•"/>
+            </a:pPr>
+            <a:endParaRPr lang="en-US" sz="900" baseline="0" dirty="0" smtClean="0"/>
+          </a:p>
+          <a:p>
+            <a:pPr marL="285750" indent="-285750">
+              <a:buFont typeface="Arial"/>
+              <a:buChar char="•"/>
+            </a:pPr>
+            <a:r>
+              <a:rPr lang="en-US" sz="900" baseline="0" dirty="0" smtClean="0"/>
+              <a:t>Tests give you trust</a:t>
+            </a:r>
+            <a:endParaRPr lang="en-US" sz="900" dirty="0" smtClean="0"/>
+          </a:p>
+          <a:p>
+            <a:endParaRPr lang="en-US" dirty="0"/>
+          </a:p>
+        </p:txBody>
+      </p:sp>
+      <p:sp>
+        <p:nvSpPr>
+          <p:cNvPr id="4" name="Header Placeholder 3"/>
+          <p:cNvSpPr>
+            <a:spLocks noGrp="1"/>
+          </p:cNvSpPr>
+          <p:nvPr>
+            <p:ph type="hdr" sz="quarter" idx="10"/>
+          </p:nvPr>
+        </p:nvSpPr>
+        <p:spPr>
+          <a:xfrm>
+            <a:off x="0" y="0"/>
+            <a:ext cx="2971800" cy="457200"/>
+          </a:xfrm>
+          <a:prstGeom prst="rect">
+            <a:avLst/>
+          </a:prstGeom>
+        </p:spPr>
+        <p:txBody>
+          <a:bodyPr/>
+          <a:lstStyle/>
+          <a:p>
+            <a:endParaRPr lang="en-US" dirty="0"/>
+          </a:p>
+        </p:txBody>
+      </p:sp>
+      <p:sp>
+        <p:nvSpPr>
+          <p:cNvPr id="5" name="Date Placeholder 4"/>
+          <p:cNvSpPr>
+            <a:spLocks noGrp="1"/>
+          </p:cNvSpPr>
+          <p:nvPr>
+            <p:ph type="dt" idx="11"/>
+          </p:nvPr>
+        </p:nvSpPr>
+        <p:spPr/>
+        <p:txBody>
+          <a:bodyPr/>
+          <a:lstStyle/>
+          <a:p>
+            <a:fld id="{81331B57-0BE5-4F82-AA58-76F53EFF3ADA}" type="datetime8">
+              <a:rPr lang="en-US" smtClean="0"/>
+              <a:pPr/>
+              <a:t>09/05/2014 22:47</a:t>
+            </a:fld>
+            <a:endParaRPr lang="en-US"/>
+          </a:p>
+        </p:txBody>
+      </p:sp>
+      <p:sp>
+        <p:nvSpPr>
+          <p:cNvPr id="7" name="Slide Number Placeholder 6"/>
+          <p:cNvSpPr>
+            <a:spLocks noGrp="1"/>
+          </p:cNvSpPr>
+          <p:nvPr>
+            <p:ph type="sldNum" sz="quarter" idx="13"/>
+          </p:nvPr>
+        </p:nvSpPr>
+        <p:spPr/>
+        <p:txBody>
+          <a:bodyPr/>
+          <a:lstStyle/>
+          <a:p>
+            <a:fld id="{EC87E0CF-87F6-4B58-B8B8-DCAB2DAAF3CA}" type="slidenum">
+              <a:rPr lang="en-US" smtClean="0"/>
+              <a:pPr/>
+              <a:t>10</a:t>
+            </a:fld>
+            <a:endParaRPr lang="en-US" dirty="0"/>
+          </a:p>
+        </p:txBody>
+      </p:sp>
+      <p:sp>
+        <p:nvSpPr>
+          <p:cNvPr id="8" name="Footer Placeholder 3"/>
+          <p:cNvSpPr>
+            <a:spLocks noGrp="1"/>
+          </p:cNvSpPr>
+          <p:nvPr>
+            <p:ph type="ftr" sz="quarter" idx="4"/>
+          </p:nvPr>
+        </p:nvSpPr>
+        <p:spPr>
+          <a:xfrm>
+            <a:off x="0" y="8685213"/>
+            <a:ext cx="6248400" cy="457200"/>
+          </a:xfrm>
+          <a:prstGeom prst="rect">
+            <a:avLst/>
+          </a:prstGeom>
+        </p:spPr>
+        <p:txBody>
+          <a:bodyPr vert="horz" lIns="91440" tIns="45720" rIns="91440" bIns="45720" rtlCol="0" anchor="b"/>
+          <a:lstStyle>
+            <a:lvl1pPr algn="l">
+              <a:defRPr sz="1200"/>
+            </a:lvl1pPr>
+          </a:lstStyle>
+          <a:p>
+            <a:r>
+              <a:rPr lang="en-US" sz="500" dirty="0" smtClean="0">
+                <a:solidFill>
+                  <a:srgbClr val="000000"/>
+                </a:solidFill>
+                <a:latin typeface="Segoe UI" pitchFamily="34" charset="0"/>
+              </a:rPr>
+              <a:t>© 2010 Microsoft Corporation. All rights reserved. Microsoft, Windows, Windows Vista and other product names are or may be registered trademarks and/or trademarks in the U.S. and/or other countries.</a:t>
+            </a:r>
+          </a:p>
+          <a:p>
+            <a:r>
+              <a:rPr lang="en-US" sz="500" dirty="0" smtClean="0">
+                <a:solidFill>
+                  <a:srgbClr val="000000"/>
+                </a:solidFill>
+                <a:latin typeface="Segoe UI" pitchFamily="34" charset="0"/>
+              </a:rPr>
+              <a:t>The information herein is for informational purposes only and represents the current view of Microsoft Corporation as of the date of this presentation.  Because Microsoft must respond to changing market conditions, it should not be interpreted to be a commitment on the part of Microsoft, and Microsoft cannot guarantee the accuracy of any information provided after the date of this presentation.  </a:t>
+            </a:r>
+            <a:br>
+              <a:rPr lang="en-US" sz="500" dirty="0" smtClean="0">
+                <a:solidFill>
+                  <a:srgbClr val="000000"/>
+                </a:solidFill>
+                <a:latin typeface="Segoe UI" pitchFamily="34" charset="0"/>
+              </a:rPr>
+            </a:br>
+            <a:r>
+              <a:rPr lang="en-US" sz="500" dirty="0" smtClean="0">
+                <a:solidFill>
+                  <a:srgbClr val="000000"/>
+                </a:solidFill>
+                <a:latin typeface="Segoe UI" pitchFamily="34" charset="0"/>
+              </a:rPr>
+              <a:t>MICROSOFT MAKES NO WARRANTIES, EXPRESS, IMPLIED OR STATUTORY, AS TO THE INFORMATION IN THIS PRESENTATION.</a:t>
+            </a:r>
+          </a:p>
+        </p:txBody>
+      </p:sp>
+    </p:spTree>
+    <p:extLst>
+      <p:ext uri="{BB962C8B-B14F-4D97-AF65-F5344CB8AC3E}">
+        <p14:creationId xmlns:p14="http://schemas.microsoft.com/office/powerpoint/2010/main" val="996071022"/>
+      </p:ext>
+    </p:extLst>
+  </p:cSld>
+  <p:clrMapOvr>
+    <a:masterClrMapping/>
+  </p:clrMapOvr>
+</p:notes>
+</file>
+
+<file path=ppt/notesSlides/notesSlide11.xml><?xml version="1.0" encoding="utf-8"?>
+<p:notes xmlns:a="http://schemas.openxmlformats.org/drawingml/2006/main" xmlns:r="http://schemas.openxmlformats.org/officeDocument/2006/relationships" xmlns:p="http://schemas.openxmlformats.org/presentationml/2006/main">
+  <p:cSld>
+    <p:spTree>
+      <p:nvGrpSpPr>
+        <p:cNvPr id="1" name=""/>
+        <p:cNvGrpSpPr/>
+        <p:nvPr/>
+      </p:nvGrpSpPr>
+      <p:grpSpPr>
+        <a:xfrm>
+          <a:off x="0" y="0"/>
+          <a:ext cx="0" cy="0"/>
+          <a:chOff x="0" y="0"/>
+          <a:chExt cx="0" cy="0"/>
+        </a:xfrm>
+      </p:grpSpPr>
+      <p:sp>
+        <p:nvSpPr>
+          <p:cNvPr id="2" name="Slide Image Placeholder 1"/>
+          <p:cNvSpPr>
+            <a:spLocks noGrp="1" noRot="1" noChangeAspect="1"/>
+          </p:cNvSpPr>
+          <p:nvPr>
+            <p:ph type="sldImg"/>
+          </p:nvPr>
+        </p:nvSpPr>
         <p:spPr/>
       </p:sp>
       <p:sp>
@@ -5149,7 +5425,7 @@
             <a:fld id="{8B263312-38AA-4E1E-B2B5-0F8F122B24FE}" type="slidenum">
               <a:rPr lang="en-US" smtClean="0"/>
               <a:pPr/>
-              <a:t>10</a:t>
+              <a:t>11</a:t>
             </a:fld>
             <a:endParaRPr lang="en-US" dirty="0"/>
           </a:p>
@@ -5168,7 +5444,7 @@
 </p:notes>
 </file>
 
-<file path=ppt/notesSlides/notesSlide11.xml><?xml version="1.0" encoding="utf-8"?>
+<file path=ppt/notesSlides/notesSlide12.xml><?xml version="1.0" encoding="utf-8"?>
 <p:notes xmlns:a="http://schemas.openxmlformats.org/drawingml/2006/main" xmlns:r="http://schemas.openxmlformats.org/officeDocument/2006/relationships" xmlns:p="http://schemas.openxmlformats.org/presentationml/2006/main">
   <p:cSld>
     <p:spTree>
@@ -5334,7 +5610,7 @@
             <a:fld id="{81331B57-0BE5-4F82-AA58-76F53EFF3ADA}" type="datetime8">
               <a:rPr lang="en-US" smtClean="0"/>
               <a:pPr/>
-              <a:t>09/05/2014 10:41</a:t>
+              <a:t>09/05/2014 22:47</a:t>
             </a:fld>
             <a:endParaRPr lang="en-US"/>
           </a:p>
@@ -5358,7 +5634,7 @@
             <a:fld id="{EC87E0CF-87F6-4B58-B8B8-DCAB2DAAF3CA}" type="slidenum">
               <a:rPr lang="en-US" smtClean="0"/>
               <a:pPr/>
-              <a:t>11</a:t>
+              <a:t>12</a:t>
             </a:fld>
             <a:endParaRPr lang="en-US" dirty="0"/>
           </a:p>
@@ -5444,7 +5720,7 @@
 </p:notes>
 </file>
 
-<file path=ppt/notesSlides/notesSlide12.xml><?xml version="1.0" encoding="utf-8"?>
+<file path=ppt/notesSlides/notesSlide13.xml><?xml version="1.0" encoding="utf-8"?>
 <p:notes xmlns:a="http://schemas.openxmlformats.org/drawingml/2006/main" xmlns:r="http://schemas.openxmlformats.org/officeDocument/2006/relationships" xmlns:p="http://schemas.openxmlformats.org/presentationml/2006/main">
   <p:cSld>
     <p:spTree>
@@ -5628,7 +5904,7 @@
             <a:fld id="{8B263312-38AA-4E1E-B2B5-0F8F122B24FE}" type="slidenum">
               <a:rPr lang="en-US" smtClean="0"/>
               <a:pPr/>
-              <a:t>12</a:t>
+              <a:t>13</a:t>
             </a:fld>
             <a:endParaRPr lang="en-US" dirty="0"/>
           </a:p>
@@ -5638,296 +5914,6 @@
     <p:extLst>
       <p:ext uri="{BB962C8B-B14F-4D97-AF65-F5344CB8AC3E}">
         <p14:creationId xmlns:p14="http://schemas.microsoft.com/office/powerpoint/2010/main" val="3482430589"/>
-      </p:ext>
-    </p:extLst>
-  </p:cSld>
-  <p:clrMapOvr>
-    <a:masterClrMapping/>
-  </p:clrMapOvr>
-</p:notes>
-</file>
-
-<file path=ppt/notesSlides/notesSlide13.xml><?xml version="1.0" encoding="utf-8"?>
-<p:notes xmlns:a="http://schemas.openxmlformats.org/drawingml/2006/main" xmlns:r="http://schemas.openxmlformats.org/officeDocument/2006/relationships" xmlns:p="http://schemas.openxmlformats.org/presentationml/2006/main">
-  <p:cSld>
-    <p:spTree>
-      <p:nvGrpSpPr>
-        <p:cNvPr id="1" name=""/>
-        <p:cNvGrpSpPr/>
-        <p:nvPr/>
-      </p:nvGrpSpPr>
-      <p:grpSpPr>
-        <a:xfrm>
-          <a:off x="0" y="0"/>
-          <a:ext cx="0" cy="0"/>
-          <a:chOff x="0" y="0"/>
-          <a:chExt cx="0" cy="0"/>
-        </a:xfrm>
-      </p:grpSpPr>
-      <p:sp>
-        <p:nvSpPr>
-          <p:cNvPr id="2" name="Slide Image Placeholder 1"/>
-          <p:cNvSpPr>
-            <a:spLocks noGrp="1" noRot="1" noChangeAspect="1"/>
-          </p:cNvSpPr>
-          <p:nvPr>
-            <p:ph type="sldImg"/>
-          </p:nvPr>
-        </p:nvSpPr>
-        <p:spPr>
-          <a:xfrm>
-            <a:off x="303213" y="685800"/>
-            <a:ext cx="6251575" cy="3429000"/>
-          </a:xfrm>
-        </p:spPr>
-      </p:sp>
-      <p:sp>
-        <p:nvSpPr>
-          <p:cNvPr id="3" name="Notes Placeholder 2"/>
-          <p:cNvSpPr>
-            <a:spLocks noGrp="1"/>
-          </p:cNvSpPr>
-          <p:nvPr>
-            <p:ph type="body" idx="1"/>
-          </p:nvPr>
-        </p:nvSpPr>
-        <p:spPr/>
-        <p:txBody>
-          <a:bodyPr>
-            <a:normAutofit/>
-          </a:bodyPr>
-          <a:lstStyle/>
-          <a:p>
-            <a:pPr marL="171450" indent="-171450">
-              <a:buFont typeface="Arial"/>
-              <a:buChar char="•"/>
-            </a:pPr>
-            <a:r>
-              <a:rPr lang="en-US" dirty="0" smtClean="0"/>
-              <a:t>Important to have everyone accept the change</a:t>
-            </a:r>
-          </a:p>
-          <a:p>
-            <a:pPr marL="171450" indent="-171450">
-              <a:buFont typeface="Arial"/>
-              <a:buChar char="•"/>
-            </a:pPr>
-            <a:endParaRPr lang="en-US" dirty="0" smtClean="0"/>
-          </a:p>
-          <a:p>
-            <a:pPr marL="171450" indent="-171450">
-              <a:buFont typeface="Arial"/>
-              <a:buChar char="•"/>
-            </a:pPr>
-            <a:r>
-              <a:rPr lang="en-US" dirty="0" smtClean="0"/>
-              <a:t>No resentment</a:t>
-            </a:r>
-          </a:p>
-          <a:p>
-            <a:pPr marL="171450" indent="-171450">
-              <a:buFont typeface="Arial"/>
-              <a:buChar char="•"/>
-            </a:pPr>
-            <a:endParaRPr lang="en-US" dirty="0" smtClean="0"/>
-          </a:p>
-          <a:p>
-            <a:pPr marL="171450" indent="-171450">
-              <a:buFont typeface="Arial"/>
-              <a:buChar char="•"/>
-            </a:pPr>
-            <a:r>
-              <a:rPr lang="en-US" dirty="0" smtClean="0"/>
-              <a:t>Get</a:t>
-            </a:r>
-            <a:r>
-              <a:rPr lang="en-US" baseline="0" dirty="0" smtClean="0"/>
-              <a:t> feedback before starting</a:t>
-            </a:r>
-          </a:p>
-          <a:p>
-            <a:pPr marL="171450" indent="-171450">
-              <a:buFont typeface="Arial"/>
-              <a:buChar char="•"/>
-            </a:pPr>
-            <a:endParaRPr lang="en-US" baseline="0" dirty="0" smtClean="0"/>
-          </a:p>
-          <a:p>
-            <a:pPr marL="171450" indent="-171450">
-              <a:buFont typeface="Arial"/>
-              <a:buChar char="•"/>
-            </a:pPr>
-            <a:r>
-              <a:rPr lang="en-US" baseline="0" dirty="0" smtClean="0"/>
-              <a:t>Share the spec</a:t>
-            </a:r>
-          </a:p>
-          <a:p>
-            <a:pPr marL="171450" indent="-171450">
-              <a:buFont typeface="Arial"/>
-              <a:buChar char="•"/>
-            </a:pPr>
-            <a:endParaRPr lang="en-US" baseline="0" dirty="0" smtClean="0"/>
-          </a:p>
-          <a:p>
-            <a:pPr marL="171450" indent="-171450">
-              <a:buFont typeface="Arial"/>
-              <a:buChar char="•"/>
-            </a:pPr>
-            <a:r>
-              <a:rPr lang="en-US" baseline="0" dirty="0" smtClean="0"/>
-              <a:t>Be available to answer questions and help</a:t>
-            </a:r>
-            <a:endParaRPr lang="en-US" dirty="0" smtClean="0"/>
-          </a:p>
-        </p:txBody>
-      </p:sp>
-      <p:sp>
-        <p:nvSpPr>
-          <p:cNvPr id="4" name="Header Placeholder 3"/>
-          <p:cNvSpPr>
-            <a:spLocks noGrp="1"/>
-          </p:cNvSpPr>
-          <p:nvPr>
-            <p:ph type="hdr" sz="quarter" idx="10"/>
-          </p:nvPr>
-        </p:nvSpPr>
-        <p:spPr>
-          <a:xfrm>
-            <a:off x="0" y="0"/>
-            <a:ext cx="2971800" cy="457200"/>
-          </a:xfrm>
-          <a:prstGeom prst="rect">
-            <a:avLst/>
-          </a:prstGeom>
-        </p:spPr>
-        <p:txBody>
-          <a:bodyPr/>
-          <a:lstStyle/>
-          <a:p>
-            <a:endParaRPr lang="en-US" dirty="0"/>
-          </a:p>
-        </p:txBody>
-      </p:sp>
-      <p:sp>
-        <p:nvSpPr>
-          <p:cNvPr id="5" name="Date Placeholder 4"/>
-          <p:cNvSpPr>
-            <a:spLocks noGrp="1"/>
-          </p:cNvSpPr>
-          <p:nvPr>
-            <p:ph type="dt" idx="11"/>
-          </p:nvPr>
-        </p:nvSpPr>
-        <p:spPr/>
-        <p:txBody>
-          <a:bodyPr/>
-          <a:lstStyle/>
-          <a:p>
-            <a:fld id="{81331B57-0BE5-4F82-AA58-76F53EFF3ADA}" type="datetime8">
-              <a:rPr lang="en-US" smtClean="0"/>
-              <a:pPr/>
-              <a:t>09/05/2014 10:42</a:t>
-            </a:fld>
-            <a:endParaRPr lang="en-US"/>
-          </a:p>
-        </p:txBody>
-      </p:sp>
-      <p:sp>
-        <p:nvSpPr>
-          <p:cNvPr id="7" name="Slide Number Placeholder 6"/>
-          <p:cNvSpPr>
-            <a:spLocks noGrp="1"/>
-          </p:cNvSpPr>
-          <p:nvPr>
-            <p:ph type="sldNum" sz="quarter" idx="13"/>
-          </p:nvPr>
-        </p:nvSpPr>
-        <p:spPr/>
-        <p:txBody>
-          <a:bodyPr/>
-          <a:lstStyle/>
-          <a:p>
-            <a:fld id="{EC87E0CF-87F6-4B58-B8B8-DCAB2DAAF3CA}" type="slidenum">
-              <a:rPr lang="en-US" smtClean="0"/>
-              <a:pPr/>
-              <a:t>13</a:t>
-            </a:fld>
-            <a:endParaRPr lang="en-US" dirty="0"/>
-          </a:p>
-        </p:txBody>
-      </p:sp>
-      <p:sp>
-        <p:nvSpPr>
-          <p:cNvPr id="8" name="Footer Placeholder 3"/>
-          <p:cNvSpPr>
-            <a:spLocks noGrp="1"/>
-          </p:cNvSpPr>
-          <p:nvPr>
-            <p:ph type="ftr" sz="quarter" idx="4"/>
-          </p:nvPr>
-        </p:nvSpPr>
-        <p:spPr>
-          <a:xfrm>
-            <a:off x="0" y="8685213"/>
-            <a:ext cx="6248400" cy="457200"/>
-          </a:xfrm>
-          <a:prstGeom prst="rect">
-            <a:avLst/>
-          </a:prstGeom>
-        </p:spPr>
-        <p:txBody>
-          <a:bodyPr vert="horz" lIns="91440" tIns="45720" rIns="91440" bIns="45720" rtlCol="0" anchor="b"/>
-          <a:lstStyle>
-            <a:lvl1pPr algn="l">
-              <a:defRPr sz="1200"/>
-            </a:lvl1pPr>
-          </a:lstStyle>
-          <a:p>
-            <a:r>
-              <a:rPr lang="en-US" sz="500" dirty="0" smtClean="0">
-                <a:solidFill>
-                  <a:srgbClr val="000000"/>
-                </a:solidFill>
-                <a:latin typeface="Segoe UI" pitchFamily="34" charset="0"/>
-              </a:rPr>
-              <a:t>© 2010 Microsoft Corporation. All rights reserved. Microsoft, Windows, Windows Vista and other product names are or may be registered trademarks and/or trademarks in the U.S. and/or other countries.</a:t>
-            </a:r>
-          </a:p>
-          <a:p>
-            <a:r>
-              <a:rPr lang="en-US" sz="500" dirty="0" smtClean="0">
-                <a:solidFill>
-                  <a:srgbClr val="000000"/>
-                </a:solidFill>
-                <a:latin typeface="Segoe UI" pitchFamily="34" charset="0"/>
-              </a:rPr>
-              <a:t>The information herein is for informational purposes only and represents the current view of Microsoft Corporation as of the date of this presentation.  Because Microsoft must respond to changing market conditions, it should not be interpreted to be a commitment on the part of Microsoft, and Microsoft cannot guarantee the accuracy of any information provided after the date of this presentation.  </a:t>
-            </a:r>
-            <a:br>
-              <a:rPr lang="en-US" sz="500" dirty="0" smtClean="0">
-                <a:solidFill>
-                  <a:srgbClr val="000000"/>
-                </a:solidFill>
-                <a:latin typeface="Segoe UI" pitchFamily="34" charset="0"/>
-              </a:rPr>
-            </a:br>
-            <a:r>
-              <a:rPr lang="en-US" sz="500" dirty="0" smtClean="0">
-                <a:solidFill>
-                  <a:srgbClr val="000000"/>
-                </a:solidFill>
-                <a:latin typeface="Segoe UI" pitchFamily="34" charset="0"/>
-              </a:rPr>
-              <a:t>MICROSOFT MAKES NO WARRANTIES, EXPRESS, IMPLIED OR STATUTORY, AS TO THE INFORMATION IN THIS PRESENTATION.</a:t>
-            </a:r>
-          </a:p>
-        </p:txBody>
-      </p:sp>
-    </p:spTree>
-    <p:extLst>
-      <p:ext uri="{BB962C8B-B14F-4D97-AF65-F5344CB8AC3E}">
-        <p14:creationId xmlns:p14="http://schemas.microsoft.com/office/powerpoint/2010/main" val="996071022"/>
       </p:ext>
     </p:extLst>
   </p:cSld>
@@ -6117,7 +6103,7 @@
             <a:fld id="{81331B57-0BE5-4F82-AA58-76F53EFF3ADA}" type="datetime8">
               <a:rPr lang="en-US" smtClean="0"/>
               <a:pPr/>
-              <a:t>09/05/2014 10:42</a:t>
+              <a:t>09/05/2014 22:47</a:t>
             </a:fld>
             <a:endParaRPr lang="en-US"/>
           </a:p>
@@ -6397,7 +6383,7 @@
             <a:fld id="{81331B57-0BE5-4F82-AA58-76F53EFF3ADA}" type="datetime8">
               <a:rPr lang="en-US" smtClean="0"/>
               <a:pPr/>
-              <a:t>09/05/2014 10:43</a:t>
+              <a:t>09/05/2014 22:47</a:t>
             </a:fld>
             <a:endParaRPr lang="en-US"/>
           </a:p>
@@ -6639,7 +6625,7 @@
             <a:fld id="{81331B57-0BE5-4F82-AA58-76F53EFF3ADA}" type="datetime8">
               <a:rPr lang="en-US" smtClean="0"/>
               <a:pPr/>
-              <a:t>09/05/2014 10:43</a:t>
+              <a:t>09/05/2014 22:47</a:t>
             </a:fld>
             <a:endParaRPr lang="en-US"/>
           </a:p>
@@ -6931,7 +6917,7 @@
             <a:fld id="{81331B57-0BE5-4F82-AA58-76F53EFF3ADA}" type="datetime8">
               <a:rPr lang="en-US" smtClean="0"/>
               <a:pPr/>
-              <a:t>09/05/2014 10:43</a:t>
+              <a:t>09/05/2014 22:47</a:t>
             </a:fld>
             <a:endParaRPr lang="en-US"/>
           </a:p>
@@ -7469,7 +7455,7 @@
             <a:fld id="{81331B57-0BE5-4F82-AA58-76F53EFF3ADA}" type="datetime8">
               <a:rPr lang="en-US" smtClean="0"/>
               <a:pPr/>
-              <a:t>09/05/2014 10:19</a:t>
+              <a:t>09/05/2014 22:47</a:t>
             </a:fld>
             <a:endParaRPr lang="en-US"/>
           </a:p>
@@ -7749,7 +7735,7 @@
             <a:fld id="{81331B57-0BE5-4F82-AA58-76F53EFF3ADA}" type="datetime8">
               <a:rPr lang="en-US" smtClean="0"/>
               <a:pPr/>
-              <a:t>09/05/2014 10:20</a:t>
+              <a:t>09/05/2014 22:47</a:t>
             </a:fld>
             <a:endParaRPr lang="en-US"/>
           </a:p>
@@ -7991,7 +7977,7 @@
             <a:fld id="{81331B57-0BE5-4F82-AA58-76F53EFF3ADA}" type="datetime8">
               <a:rPr lang="en-US" smtClean="0"/>
               <a:pPr/>
-              <a:t>09/05/2014 10:20</a:t>
+              <a:t>09/05/2014 22:47</a:t>
             </a:fld>
             <a:endParaRPr lang="en-US"/>
           </a:p>
@@ -8267,7 +8253,7 @@
             <a:fld id="{81331B57-0BE5-4F82-AA58-76F53EFF3ADA}" type="datetime8">
               <a:rPr lang="en-US" smtClean="0"/>
               <a:pPr/>
-              <a:t>09/05/2014 10:21</a:t>
+              <a:t>09/05/2014 22:47</a:t>
             </a:fld>
             <a:endParaRPr lang="en-US"/>
           </a:p>
@@ -8434,7 +8420,32 @@
             </a:pPr>
             <a:r>
               <a:rPr lang="en-US" sz="900" dirty="0" smtClean="0"/>
-              <a:t>Don’t refactor in a silo</a:t>
+              <a:t>Myself</a:t>
+            </a:r>
+            <a:r>
+              <a:rPr lang="en-US" sz="900" baseline="0" dirty="0" smtClean="0"/>
+              <a:t> and one other person</a:t>
+            </a:r>
+          </a:p>
+          <a:p>
+            <a:pPr marL="285750" indent="-285750">
+              <a:buFont typeface="Arial"/>
+              <a:buChar char="•"/>
+            </a:pPr>
+            <a:endParaRPr lang="en-US" sz="900" dirty="0" smtClean="0"/>
+          </a:p>
+          <a:p>
+            <a:pPr marL="285750" indent="-285750">
+              <a:buFont typeface="Arial"/>
+              <a:buChar char="•"/>
+            </a:pPr>
+            <a:r>
+              <a:rPr lang="en-US" sz="900" dirty="0" smtClean="0"/>
+              <a:t>Don’t </a:t>
+            </a:r>
+            <a:r>
+              <a:rPr lang="en-US" sz="900" dirty="0" smtClean="0"/>
+              <a:t>refactor in a silo</a:t>
             </a:r>
           </a:p>
           <a:p>
@@ -8543,7 +8554,7 @@
             <a:fld id="{81331B57-0BE5-4F82-AA58-76F53EFF3ADA}" type="datetime8">
               <a:rPr lang="en-US" smtClean="0"/>
               <a:pPr/>
-              <a:t>09/05/2014 10:38</a:t>
+              <a:t>09/05/2014 22:47</a:t>
             </a:fld>
             <a:endParaRPr lang="en-US"/>
           </a:p>
@@ -8731,8 +8742,9 @@
             </a:pPr>
             <a:r>
               <a:rPr lang="en-US" sz="900" baseline="0" dirty="0" smtClean="0"/>
-              <a:t>Not everything is written down</a:t>
-            </a:r>
+              <a:t>Talked to team about their problems</a:t>
+            </a:r>
+            <a:endParaRPr lang="en-US" sz="900" baseline="0" dirty="0" smtClean="0"/>
           </a:p>
           <a:p>
             <a:pPr marL="285750" indent="-285750">
@@ -8819,7 +8831,7 @@
             <a:fld id="{81331B57-0BE5-4F82-AA58-76F53EFF3ADA}" type="datetime8">
               <a:rPr lang="en-US" smtClean="0"/>
               <a:pPr/>
-              <a:t>09/05/2014 10:38</a:t>
+              <a:t>09/05/2014 22:47</a:t>
             </a:fld>
             <a:endParaRPr lang="en-US"/>
           </a:p>
@@ -8980,90 +8992,87 @@
           </a:bodyPr>
           <a:lstStyle/>
           <a:p>
-            <a:pPr marL="285750" indent="-285750">
+            <a:pPr marL="171450" indent="-171450">
               <a:buFont typeface="Arial"/>
               <a:buChar char="•"/>
             </a:pPr>
             <a:r>
-              <a:rPr lang="en-US" sz="900" dirty="0" smtClean="0"/>
-              <a:t>Step 1: Commit to master</a:t>
-            </a:r>
-          </a:p>
-          <a:p>
-            <a:pPr marL="285750" indent="-285750">
+              <a:rPr lang="en-US" dirty="0" smtClean="0"/>
+              <a:t>Important to have everyone accept the change</a:t>
+            </a:r>
+          </a:p>
+          <a:p>
+            <a:pPr marL="171450" indent="-171450">
               <a:buFont typeface="Arial"/>
               <a:buChar char="•"/>
             </a:pPr>
-            <a:endParaRPr lang="en-US" sz="900" dirty="0" smtClean="0"/>
-          </a:p>
-          <a:p>
-            <a:pPr marL="285750" indent="-285750">
+            <a:endParaRPr lang="en-US" dirty="0" smtClean="0"/>
+          </a:p>
+          <a:p>
+            <a:pPr marL="171450" indent="-171450">
               <a:buFont typeface="Arial"/>
               <a:buChar char="•"/>
             </a:pPr>
             <a:r>
-              <a:rPr lang="en-US" sz="900" dirty="0" smtClean="0"/>
-              <a:t>Use a</a:t>
-            </a:r>
-            <a:r>
-              <a:rPr lang="en-US" sz="900" baseline="0" dirty="0" smtClean="0"/>
-              <a:t> feature gate</a:t>
-            </a:r>
-          </a:p>
-          <a:p>
-            <a:pPr marL="285750" indent="-285750">
+              <a:rPr lang="en-US" dirty="0" smtClean="0"/>
+              <a:t>No resentment</a:t>
+            </a:r>
+          </a:p>
+          <a:p>
+            <a:pPr marL="171450" indent="-171450">
               <a:buFont typeface="Arial"/>
               <a:buChar char="•"/>
             </a:pPr>
-            <a:endParaRPr lang="en-US" sz="900" baseline="0" dirty="0" smtClean="0"/>
-          </a:p>
-          <a:p>
-            <a:pPr marL="285750" indent="-285750">
+            <a:endParaRPr lang="en-US" dirty="0" smtClean="0"/>
+          </a:p>
+          <a:p>
+            <a:pPr marL="171450" indent="-171450">
               <a:buFont typeface="Arial"/>
               <a:buChar char="•"/>
             </a:pPr>
             <a:r>
-              <a:rPr lang="en-US" sz="900" baseline="0" dirty="0" smtClean="0"/>
-              <a:t>What is a feature gate, no long branches</a:t>
-            </a:r>
-          </a:p>
-          <a:p>
-            <a:pPr marL="285750" indent="-285750">
+              <a:rPr lang="en-US" dirty="0" smtClean="0"/>
+              <a:t>Get</a:t>
+            </a:r>
+            <a:r>
+              <a:rPr lang="en-US" baseline="0" dirty="0" smtClean="0"/>
+              <a:t> feedback before starting</a:t>
+            </a:r>
+          </a:p>
+          <a:p>
+            <a:pPr marL="171450" indent="-171450">
               <a:buFont typeface="Arial"/>
               <a:buChar char="•"/>
             </a:pPr>
-            <a:endParaRPr lang="en-US" sz="900" baseline="0" dirty="0" smtClean="0"/>
-          </a:p>
-          <a:p>
-            <a:pPr marL="285750" indent="-285750">
+            <a:endParaRPr lang="en-US" baseline="0" dirty="0" smtClean="0"/>
+          </a:p>
+          <a:p>
+            <a:pPr marL="171450" indent="-171450">
               <a:buFont typeface="Arial"/>
               <a:buChar char="•"/>
             </a:pPr>
             <a:r>
-              <a:rPr lang="en-US" sz="900" baseline="0" dirty="0" smtClean="0"/>
-              <a:t>3 projects did work along side us</a:t>
-            </a:r>
-          </a:p>
-          <a:p>
-            <a:pPr marL="285750" indent="-285750">
+              <a:rPr lang="en-US" baseline="0" dirty="0" smtClean="0"/>
+              <a:t>Share the spec</a:t>
+            </a:r>
+          </a:p>
+          <a:p>
+            <a:pPr marL="171450" indent="-171450">
               <a:buFont typeface="Arial"/>
               <a:buChar char="•"/>
             </a:pPr>
-            <a:endParaRPr lang="en-US" sz="900" baseline="0" dirty="0" smtClean="0"/>
-          </a:p>
-          <a:p>
-            <a:pPr marL="285750" indent="-285750">
+            <a:endParaRPr lang="en-US" baseline="0" dirty="0" smtClean="0"/>
+          </a:p>
+          <a:p>
+            <a:pPr marL="171450" indent="-171450">
               <a:buFont typeface="Arial"/>
               <a:buChar char="•"/>
             </a:pPr>
             <a:r>
-              <a:rPr lang="en-US" sz="900" baseline="0" dirty="0" smtClean="0"/>
-              <a:t>1 month till first merge to master and then every few days</a:t>
-            </a:r>
-            <a:endParaRPr lang="en-US" sz="900" dirty="0" smtClean="0"/>
-          </a:p>
-          <a:p>
-            <a:endParaRPr lang="en-US" dirty="0"/>
+              <a:rPr lang="en-US" baseline="0" dirty="0" smtClean="0"/>
+              <a:t>Be available to answer questions and help</a:t>
+            </a:r>
+            <a:endParaRPr lang="en-US" dirty="0" smtClean="0"/>
           </a:p>
         </p:txBody>
       </p:sp>
@@ -9112,7 +9121,7 @@
             <a:fld id="{81331B57-0BE5-4F82-AA58-76F53EFF3ADA}" type="datetime8">
               <a:rPr lang="en-US" smtClean="0"/>
               <a:pPr/>
-              <a:t>09/05/2014 10:39</a:t>
+              <a:t>09/05/2014 22:47</a:t>
             </a:fld>
             <a:endParaRPr lang="en-US"/>
           </a:p>
@@ -9279,11 +9288,28 @@
             </a:pPr>
             <a:r>
               <a:rPr lang="en-US" sz="900" dirty="0" smtClean="0"/>
-              <a:t>Fork</a:t>
+              <a:t>Step 1: Commit to master</a:t>
+            </a:r>
+          </a:p>
+          <a:p>
+            <a:pPr marL="285750" indent="-285750">
+              <a:buFont typeface="Arial"/>
+              <a:buChar char="•"/>
+            </a:pPr>
+            <a:endParaRPr lang="en-US" sz="900" dirty="0" smtClean="0"/>
+          </a:p>
+          <a:p>
+            <a:pPr marL="285750" indent="-285750">
+              <a:buFont typeface="Arial"/>
+              <a:buChar char="•"/>
+            </a:pPr>
+            <a:r>
+              <a:rPr lang="en-US" sz="900" dirty="0" smtClean="0"/>
+              <a:t>Use a</a:t>
             </a:r>
             <a:r>
               <a:rPr lang="en-US" sz="900" baseline="0" dirty="0" smtClean="0"/>
-              <a:t> the tests</a:t>
+              <a:t> feature gate</a:t>
             </a:r>
           </a:p>
           <a:p>
@@ -9300,7 +9326,7 @@
             </a:pPr>
             <a:r>
               <a:rPr lang="en-US" sz="900" baseline="0" dirty="0" smtClean="0"/>
-              <a:t>Both old and new should be under test</a:t>
+              <a:t>What is a feature gate, no long branches</a:t>
             </a:r>
           </a:p>
           <a:p>
@@ -9317,7 +9343,7 @@
             </a:pPr>
             <a:r>
               <a:rPr lang="en-US" sz="900" baseline="0" dirty="0" smtClean="0"/>
-              <a:t>Over the last two years we’ve gotten to 70% coverage – 5781 tests</a:t>
+              <a:t>3 projects did work along side us</a:t>
             </a:r>
           </a:p>
           <a:p>
@@ -9334,7 +9360,7 @@
             </a:pPr>
             <a:r>
               <a:rPr lang="en-US" sz="900" baseline="0" dirty="0" smtClean="0"/>
-              <a:t>Tests give you trust</a:t>
+              <a:t>1 month till first merge to master and then every few days</a:t>
             </a:r>
             <a:endParaRPr lang="en-US" sz="900" dirty="0" smtClean="0"/>
           </a:p>
@@ -9388,7 +9414,7 @@
             <a:fld id="{81331B57-0BE5-4F82-AA58-76F53EFF3ADA}" type="datetime8">
               <a:rPr lang="en-US" smtClean="0"/>
               <a:pPr/>
-              <a:t>09/05/2014 10:39</a:t>
+              <a:t>09/05/2014 22:47</a:t>
             </a:fld>
             <a:endParaRPr lang="en-US"/>
           </a:p>
@@ -13028,38 +13054,9 @@
           <a:chExt cx="0" cy="0"/>
         </a:xfrm>
       </p:grpSpPr>
-      <p:pic>
-        <p:nvPicPr>
-          <p:cNvPr id="3" name="Picture 2" descr="Code_coverage_report_for_feeds_lib_ui_threads_future_thread_list_js.png"/>
-          <p:cNvPicPr>
-            <a:picLocks noChangeAspect="1"/>
-          </p:cNvPicPr>
-          <p:nvPr/>
-        </p:nvPicPr>
-        <p:blipFill rotWithShape="1">
-          <a:blip r:embed="rId3">
-            <a:extLst>
-              <a:ext uri="{28A0092B-C50C-407E-A947-70E740481C1C}">
-                <a14:useLocalDpi xmlns:a14="http://schemas.microsoft.com/office/drawing/2010/main" val="0"/>
-              </a:ext>
-            </a:extLst>
-          </a:blip>
-          <a:srcRect t="1343" r="50220" b="19022"/>
-          <a:stretch/>
-        </p:blipFill>
-        <p:spPr>
-          <a:xfrm>
-            <a:off x="5721315" y="872301"/>
-            <a:ext cx="5965590" cy="5323597"/>
-          </a:xfrm>
-          <a:prstGeom prst="rect">
-            <a:avLst/>
-          </a:prstGeom>
-        </p:spPr>
-      </p:pic>
       <p:sp>
         <p:nvSpPr>
-          <p:cNvPr id="4" name="Rectangle 3"/>
+          <p:cNvPr id="6" name="Rectangle 3"/>
           <p:cNvSpPr txBox="1">
             <a:spLocks noChangeArrowheads="1"/>
           </p:cNvSpPr>
@@ -13067,7 +13064,7 @@
         </p:nvSpPr>
         <p:spPr>
           <a:xfrm>
-            <a:off x="512763" y="4041437"/>
+            <a:off x="512763" y="975545"/>
             <a:ext cx="11694722" cy="846386"/>
           </a:xfrm>
           <a:prstGeom prst="rect">
@@ -13089,7 +13086,7 @@
               </a:spcBef>
               <a:buFontTx/>
               <a:buBlip>
-                <a:blip r:embed="rId4"/>
+                <a:blip r:embed="rId3"/>
               </a:buBlip>
               <a:defRPr sz="3200" kern="1200">
                 <a:gradFill>
@@ -13117,7 +13114,7 @@
               </a:spcBef>
               <a:buFontTx/>
               <a:buBlip>
-                <a:blip r:embed="rId5"/>
+                <a:blip r:embed="rId4"/>
               </a:buBlip>
               <a:defRPr sz="2800" kern="1200">
                 <a:gradFill>
@@ -13145,7 +13142,7 @@
               </a:spcBef>
               <a:buFontTx/>
               <a:buBlip>
-                <a:blip r:embed="rId5"/>
+                <a:blip r:embed="rId4"/>
               </a:buBlip>
               <a:defRPr sz="2400" kern="1200">
                 <a:gradFill>
@@ -13173,7 +13170,7 @@
               </a:spcBef>
               <a:buFontTx/>
               <a:buBlip>
-                <a:blip r:embed="rId5"/>
+                <a:blip r:embed="rId4"/>
               </a:buBlip>
               <a:defRPr sz="2000" kern="1200">
                 <a:gradFill>
@@ -13201,7 +13198,7 @@
               </a:spcBef>
               <a:buFontTx/>
               <a:buBlip>
-                <a:blip r:embed="rId5"/>
+                <a:blip r:embed="rId4"/>
               </a:buBlip>
               <a:defRPr sz="2000" kern="1200">
                 <a:gradFill>
@@ -13289,7 +13286,7 @@
               <a:buNone/>
             </a:pPr>
             <a:r>
-              <a:rPr lang="en-US" sz="6000" spc="-100" dirty="0" err="1" smtClean="0">
+              <a:rPr lang="en-US" sz="6000" spc="-100" dirty="0" smtClean="0">
                 <a:ln w="3175">
                   <a:noFill/>
                 </a:ln>
@@ -13307,7 +13304,7 @@
                 <a:latin typeface="+mj-lt"/>
                 <a:cs typeface="Arial" charset="0"/>
               </a:rPr>
-              <a:t>Instanbul</a:t>
+              <a:t>Fork the tests</a:t>
             </a:r>
             <a:endParaRPr lang="en-US" sz="6000" spc="-100" dirty="0">
               <a:ln w="3175">
@@ -13332,7 +13329,133 @@
       </p:sp>
       <p:sp>
         <p:nvSpPr>
-          <p:cNvPr id="5" name="TextBox 4"/>
+          <p:cNvPr id="3" name="TextBox 2"/>
+          <p:cNvSpPr txBox="1"/>
+          <p:nvPr/>
+        </p:nvSpPr>
+        <p:spPr>
+          <a:xfrm>
+            <a:off x="602947" y="2655385"/>
+            <a:ext cx="5435432" cy="615553"/>
+          </a:xfrm>
+          <a:prstGeom prst="rect">
+            <a:avLst/>
+          </a:prstGeom>
+          <a:noFill/>
+        </p:spPr>
+        <p:txBody>
+          <a:bodyPr wrap="none" lIns="0" tIns="0" rIns="0" bIns="0" rtlCol="0">
+            <a:spAutoFit/>
+          </a:bodyPr>
+          <a:lstStyle/>
+          <a:p>
+            <a:r>
+              <a:rPr lang="en-US" sz="4000" dirty="0" smtClean="0">
+                <a:gradFill>
+                  <a:gsLst>
+                    <a:gs pos="0">
+                      <a:schemeClr val="tx1"/>
+                    </a:gs>
+                    <a:gs pos="86000">
+                      <a:schemeClr val="tx1"/>
+                    </a:gs>
+                  </a:gsLst>
+                  <a:lin ang="5400000" scaled="0"/>
+                </a:gradFill>
+                <a:latin typeface="Segoe UI Light" pitchFamily="34" charset="0"/>
+              </a:rPr>
+              <a:t>Tests give you confidence</a:t>
+            </a:r>
+          </a:p>
+        </p:txBody>
+      </p:sp>
+      <p:sp>
+        <p:nvSpPr>
+          <p:cNvPr id="7" name="TextBox 6"/>
+          <p:cNvSpPr txBox="1"/>
+          <p:nvPr/>
+        </p:nvSpPr>
+        <p:spPr>
+          <a:xfrm>
+            <a:off x="602947" y="3546927"/>
+            <a:ext cx="8436805" cy="615553"/>
+          </a:xfrm>
+          <a:prstGeom prst="rect">
+            <a:avLst/>
+          </a:prstGeom>
+          <a:noFill/>
+        </p:spPr>
+        <p:txBody>
+          <a:bodyPr wrap="none" lIns="0" tIns="0" rIns="0" bIns="0" rtlCol="0">
+            <a:spAutoFit/>
+          </a:bodyPr>
+          <a:lstStyle/>
+          <a:p>
+            <a:r>
+              <a:rPr lang="en-US" sz="4000" dirty="0" smtClean="0">
+                <a:gradFill>
+                  <a:gsLst>
+                    <a:gs pos="0">
+                      <a:schemeClr val="tx1"/>
+                    </a:gs>
+                    <a:gs pos="86000">
+                      <a:schemeClr val="tx1"/>
+                    </a:gs>
+                  </a:gsLst>
+                  <a:lin ang="5400000" scaled="0"/>
+                </a:gradFill>
+                <a:latin typeface="Segoe UI Light" pitchFamily="34" charset="0"/>
+              </a:rPr>
+              <a:t>Spent the last year getting coverage up</a:t>
+            </a:r>
+          </a:p>
+        </p:txBody>
+      </p:sp>
+      <p:sp>
+        <p:nvSpPr>
+          <p:cNvPr id="8" name="TextBox 7"/>
+          <p:cNvSpPr txBox="1"/>
+          <p:nvPr/>
+        </p:nvSpPr>
+        <p:spPr>
+          <a:xfrm>
+            <a:off x="602947" y="4438468"/>
+            <a:ext cx="6556032" cy="615553"/>
+          </a:xfrm>
+          <a:prstGeom prst="rect">
+            <a:avLst/>
+          </a:prstGeom>
+          <a:noFill/>
+        </p:spPr>
+        <p:txBody>
+          <a:bodyPr wrap="none" lIns="0" tIns="0" rIns="0" bIns="0" rtlCol="0">
+            <a:spAutoFit/>
+          </a:bodyPr>
+          <a:lstStyle/>
+          <a:p>
+            <a:r>
+              <a:rPr lang="en-US" sz="4000" dirty="0" smtClean="0">
+                <a:gradFill>
+                  <a:gsLst>
+                    <a:gs pos="0">
+                      <a:schemeClr val="tx1"/>
+                    </a:gs>
+                    <a:gs pos="86000">
+                      <a:schemeClr val="tx1"/>
+                    </a:gs>
+                  </a:gsLst>
+                  <a:lin ang="5400000" scaled="0"/>
+                </a:gradFill>
+                <a:latin typeface="Segoe UI Light" pitchFamily="34" charset="0"/>
+              </a:rPr>
+              <a:t>You can’t refactor without tests</a:t>
+            </a:r>
+          </a:p>
+        </p:txBody>
+      </p:sp>
+      <p:sp>
+        <p:nvSpPr>
+          <p:cNvPr id="9" name="TextBox 8"/>
           <p:cNvSpPr txBox="1"/>
           <p:nvPr/>
         </p:nvSpPr>
@@ -13403,136 +13526,10 @@
           </a:p>
         </p:txBody>
       </p:sp>
-      <p:sp>
-        <p:nvSpPr>
-          <p:cNvPr id="6" name="TextBox 5"/>
-          <p:cNvSpPr txBox="1"/>
-          <p:nvPr/>
-        </p:nvSpPr>
-        <p:spPr>
-          <a:xfrm>
-            <a:off x="525977" y="4913116"/>
-            <a:ext cx="4578176" cy="738664"/>
-          </a:xfrm>
-          <a:prstGeom prst="rect">
-            <a:avLst/>
-          </a:prstGeom>
-          <a:noFill/>
-        </p:spPr>
-        <p:txBody>
-          <a:bodyPr wrap="none" lIns="0" tIns="0" rIns="0" bIns="0" rtlCol="0">
-            <a:spAutoFit/>
-          </a:bodyPr>
-          <a:lstStyle/>
-          <a:p>
-            <a:r>
-              <a:rPr lang="en-US" sz="2400" dirty="0">
-                <a:gradFill>
-                  <a:gsLst>
-                    <a:gs pos="0">
-                      <a:schemeClr val="tx1"/>
-                    </a:gs>
-                    <a:gs pos="86000">
-                      <a:schemeClr val="tx1"/>
-                    </a:gs>
-                  </a:gsLst>
-                  <a:lin ang="5400000" scaled="0"/>
-                </a:gradFill>
-                <a:latin typeface="Segoe UI Light" pitchFamily="34" charset="0"/>
-              </a:rPr>
-              <a:t>http://</a:t>
-            </a:r>
-            <a:r>
-              <a:rPr lang="en-US" sz="2400" dirty="0" err="1">
-                <a:gradFill>
-                  <a:gsLst>
-                    <a:gs pos="0">
-                      <a:schemeClr val="tx1"/>
-                    </a:gs>
-                    <a:gs pos="86000">
-                      <a:schemeClr val="tx1"/>
-                    </a:gs>
-                  </a:gsLst>
-                  <a:lin ang="5400000" scaled="0"/>
-                </a:gradFill>
-                <a:latin typeface="Segoe UI Light" pitchFamily="34" charset="0"/>
-              </a:rPr>
-              <a:t>gotwarlost.github.io</a:t>
-            </a:r>
-            <a:r>
-              <a:rPr lang="en-US" sz="2400" dirty="0">
-                <a:gradFill>
-                  <a:gsLst>
-                    <a:gs pos="0">
-                      <a:schemeClr val="tx1"/>
-                    </a:gs>
-                    <a:gs pos="86000">
-                      <a:schemeClr val="tx1"/>
-                    </a:gs>
-                  </a:gsLst>
-                  <a:lin ang="5400000" scaled="0"/>
-                </a:gradFill>
-                <a:latin typeface="Segoe UI Light" pitchFamily="34" charset="0"/>
-              </a:rPr>
-              <a:t>/</a:t>
-            </a:r>
-            <a:r>
-              <a:rPr lang="en-US" sz="2400" dirty="0" err="1">
-                <a:gradFill>
-                  <a:gsLst>
-                    <a:gs pos="0">
-                      <a:schemeClr val="tx1"/>
-                    </a:gs>
-                    <a:gs pos="86000">
-                      <a:schemeClr val="tx1"/>
-                    </a:gs>
-                  </a:gsLst>
-                  <a:lin ang="5400000" scaled="0"/>
-                </a:gradFill>
-                <a:latin typeface="Segoe UI Light" pitchFamily="34" charset="0"/>
-              </a:rPr>
-              <a:t>istanbul</a:t>
-            </a:r>
-            <a:r>
-              <a:rPr lang="en-US" sz="2400" dirty="0">
-                <a:gradFill>
-                  <a:gsLst>
-                    <a:gs pos="0">
-                      <a:schemeClr val="tx1"/>
-                    </a:gs>
-                    <a:gs pos="86000">
-                      <a:schemeClr val="tx1"/>
-                    </a:gs>
-                  </a:gsLst>
-                  <a:lin ang="5400000" scaled="0"/>
-                </a:gradFill>
-                <a:latin typeface="Segoe UI Light" pitchFamily="34" charset="0"/>
-              </a:rPr>
-              <a:t>/</a:t>
-            </a:r>
-          </a:p>
-          <a:p>
-            <a:endParaRPr lang="en-US" sz="2400" dirty="0" err="1" smtClean="0">
-              <a:gradFill>
-                <a:gsLst>
-                  <a:gs pos="0">
-                    <a:schemeClr val="tx1"/>
-                  </a:gs>
-                  <a:gs pos="86000">
-                    <a:schemeClr val="tx1"/>
-                  </a:gs>
-                </a:gsLst>
-                <a:lin ang="5400000" scaled="0"/>
-              </a:gradFill>
-              <a:latin typeface="Segoe UI Light" pitchFamily="34" charset="0"/>
-            </a:endParaRPr>
-          </a:p>
-        </p:txBody>
-      </p:sp>
     </p:spTree>
     <p:extLst>
       <p:ext uri="{BB962C8B-B14F-4D97-AF65-F5344CB8AC3E}">
-        <p14:creationId xmlns:p14="http://schemas.microsoft.com/office/powerpoint/2010/main" val="2012525684"/>
+        <p14:creationId xmlns:p14="http://schemas.microsoft.com/office/powerpoint/2010/main" val="2119081702"/>
       </p:ext>
     </p:extLst>
   </p:cSld>
@@ -13574,9 +13571,38 @@
           <a:chExt cx="0" cy="0"/>
         </a:xfrm>
       </p:grpSpPr>
+      <p:pic>
+        <p:nvPicPr>
+          <p:cNvPr id="3" name="Picture 2" descr="Code_coverage_report_for_feeds_lib_ui_threads_future_thread_list_js.png"/>
+          <p:cNvPicPr>
+            <a:picLocks noChangeAspect="1"/>
+          </p:cNvPicPr>
+          <p:nvPr/>
+        </p:nvPicPr>
+        <p:blipFill rotWithShape="1">
+          <a:blip r:embed="rId3">
+            <a:extLst>
+              <a:ext uri="{28A0092B-C50C-407E-A947-70E740481C1C}">
+                <a14:useLocalDpi xmlns:a14="http://schemas.microsoft.com/office/drawing/2010/main" val="0"/>
+              </a:ext>
+            </a:extLst>
+          </a:blip>
+          <a:srcRect t="1343" r="50220" b="19022"/>
+          <a:stretch/>
+        </p:blipFill>
+        <p:spPr>
+          <a:xfrm>
+            <a:off x="5721315" y="872301"/>
+            <a:ext cx="5965590" cy="5323597"/>
+          </a:xfrm>
+          <a:prstGeom prst="rect">
+            <a:avLst/>
+          </a:prstGeom>
+        </p:spPr>
+      </p:pic>
       <p:sp>
         <p:nvSpPr>
-          <p:cNvPr id="6" name="Rectangle 3"/>
+          <p:cNvPr id="4" name="Rectangle 3"/>
           <p:cNvSpPr txBox="1">
             <a:spLocks noChangeArrowheads="1"/>
           </p:cNvSpPr>
@@ -13584,7 +13610,7 @@
         </p:nvSpPr>
         <p:spPr>
           <a:xfrm>
-            <a:off x="512763" y="975545"/>
+            <a:off x="512763" y="4041437"/>
             <a:ext cx="11694722" cy="846386"/>
           </a:xfrm>
           <a:prstGeom prst="rect">
@@ -13606,7 +13632,7 @@
               </a:spcBef>
               <a:buFontTx/>
               <a:buBlip>
-                <a:blip r:embed="rId3"/>
+                <a:blip r:embed="rId4"/>
               </a:buBlip>
               <a:defRPr sz="3200" kern="1200">
                 <a:gradFill>
@@ -13634,7 +13660,7 @@
               </a:spcBef>
               <a:buFontTx/>
               <a:buBlip>
-                <a:blip r:embed="rId4"/>
+                <a:blip r:embed="rId5"/>
               </a:buBlip>
               <a:defRPr sz="2800" kern="1200">
                 <a:gradFill>
@@ -13662,7 +13688,7 @@
               </a:spcBef>
               <a:buFontTx/>
               <a:buBlip>
-                <a:blip r:embed="rId4"/>
+                <a:blip r:embed="rId5"/>
               </a:buBlip>
               <a:defRPr sz="2400" kern="1200">
                 <a:gradFill>
@@ -13690,7 +13716,7 @@
               </a:spcBef>
               <a:buFontTx/>
               <a:buBlip>
-                <a:blip r:embed="rId4"/>
+                <a:blip r:embed="rId5"/>
               </a:buBlip>
               <a:defRPr sz="2000" kern="1200">
                 <a:gradFill>
@@ -13718,7 +13744,7 @@
               </a:spcBef>
               <a:buFontTx/>
               <a:buBlip>
-                <a:blip r:embed="rId4"/>
+                <a:blip r:embed="rId5"/>
               </a:buBlip>
               <a:defRPr sz="2000" kern="1200">
                 <a:gradFill>
@@ -13806,7 +13832,7 @@
               <a:buNone/>
             </a:pPr>
             <a:r>
-              <a:rPr lang="en-US" sz="6000" spc="-100" dirty="0" smtClean="0">
+              <a:rPr lang="en-US" sz="6000" spc="-100" dirty="0" err="1" smtClean="0">
                 <a:ln w="3175">
                   <a:noFill/>
                 </a:ln>
@@ -13824,7 +13850,7 @@
                 <a:latin typeface="+mj-lt"/>
                 <a:cs typeface="Arial" charset="0"/>
               </a:rPr>
-              <a:t>Think about the API</a:t>
+              <a:t>Instanbul</a:t>
             </a:r>
             <a:endParaRPr lang="en-US" sz="6000" spc="-100" dirty="0">
               <a:ln w="3175">
@@ -13849,133 +13875,7 @@
       </p:sp>
       <p:sp>
         <p:nvSpPr>
-          <p:cNvPr id="3" name="TextBox 2"/>
-          <p:cNvSpPr txBox="1"/>
-          <p:nvPr/>
-        </p:nvSpPr>
-        <p:spPr>
-          <a:xfrm>
-            <a:off x="602947" y="2655385"/>
-            <a:ext cx="7822654" cy="615553"/>
-          </a:xfrm>
-          <a:prstGeom prst="rect">
-            <a:avLst/>
-          </a:prstGeom>
-          <a:noFill/>
-        </p:spPr>
-        <p:txBody>
-          <a:bodyPr wrap="none" lIns="0" tIns="0" rIns="0" bIns="0" rtlCol="0">
-            <a:spAutoFit/>
-          </a:bodyPr>
-          <a:lstStyle/>
-          <a:p>
-            <a:r>
-              <a:rPr lang="en-US" sz="4000" dirty="0" smtClean="0">
-                <a:gradFill>
-                  <a:gsLst>
-                    <a:gs pos="0">
-                      <a:schemeClr val="tx1"/>
-                    </a:gs>
-                    <a:gs pos="86000">
-                      <a:schemeClr val="tx1"/>
-                    </a:gs>
-                  </a:gsLst>
-                  <a:lin ang="5400000" scaled="0"/>
-                </a:gradFill>
-                <a:latin typeface="Segoe UI Light" pitchFamily="34" charset="0"/>
-              </a:rPr>
-              <a:t>How will others use this component?</a:t>
-            </a:r>
-          </a:p>
-        </p:txBody>
-      </p:sp>
-      <p:sp>
-        <p:nvSpPr>
-          <p:cNvPr id="7" name="TextBox 6"/>
-          <p:cNvSpPr txBox="1"/>
-          <p:nvPr/>
-        </p:nvSpPr>
-        <p:spPr>
-          <a:xfrm>
-            <a:off x="602947" y="3546927"/>
-            <a:ext cx="6307316" cy="615553"/>
-          </a:xfrm>
-          <a:prstGeom prst="rect">
-            <a:avLst/>
-          </a:prstGeom>
-          <a:noFill/>
-        </p:spPr>
-        <p:txBody>
-          <a:bodyPr wrap="none" lIns="0" tIns="0" rIns="0" bIns="0" rtlCol="0">
-            <a:spAutoFit/>
-          </a:bodyPr>
-          <a:lstStyle/>
-          <a:p>
-            <a:r>
-              <a:rPr lang="en-US" sz="4000" dirty="0">
-                <a:gradFill>
-                  <a:gsLst>
-                    <a:gs pos="0">
-                      <a:schemeClr val="tx1"/>
-                    </a:gs>
-                    <a:gs pos="86000">
-                      <a:schemeClr val="tx1"/>
-                    </a:gs>
-                  </a:gsLst>
-                  <a:lin ang="5400000" scaled="0"/>
-                </a:gradFill>
-                <a:latin typeface="Segoe UI Light" pitchFamily="34" charset="0"/>
-              </a:rPr>
-              <a:t>Hack up different approaches</a:t>
-            </a:r>
-          </a:p>
-        </p:txBody>
-      </p:sp>
-      <p:sp>
-        <p:nvSpPr>
-          <p:cNvPr id="8" name="TextBox 7"/>
-          <p:cNvSpPr txBox="1"/>
-          <p:nvPr/>
-        </p:nvSpPr>
-        <p:spPr>
-          <a:xfrm>
-            <a:off x="602947" y="4438468"/>
-            <a:ext cx="8286523" cy="615553"/>
-          </a:xfrm>
-          <a:prstGeom prst="rect">
-            <a:avLst/>
-          </a:prstGeom>
-          <a:noFill/>
-        </p:spPr>
-        <p:txBody>
-          <a:bodyPr wrap="none" lIns="0" tIns="0" rIns="0" bIns="0" rtlCol="0">
-            <a:spAutoFit/>
-          </a:bodyPr>
-          <a:lstStyle/>
-          <a:p>
-            <a:r>
-              <a:rPr lang="en-US" sz="4000" dirty="0" smtClean="0">
-                <a:gradFill>
-                  <a:gsLst>
-                    <a:gs pos="0">
-                      <a:schemeClr val="tx1"/>
-                    </a:gs>
-                    <a:gs pos="86000">
-                      <a:schemeClr val="tx1"/>
-                    </a:gs>
-                  </a:gsLst>
-                  <a:lin ang="5400000" scaled="0"/>
-                </a:gradFill>
-                <a:latin typeface="Segoe UI Light" pitchFamily="34" charset="0"/>
-              </a:rPr>
-              <a:t>Be explicit – don’t repeat past mistakes</a:t>
-            </a:r>
-          </a:p>
-        </p:txBody>
-      </p:sp>
-      <p:sp>
-        <p:nvSpPr>
-          <p:cNvPr id="9" name="TextBox 8"/>
+          <p:cNvPr id="5" name="TextBox 4"/>
           <p:cNvSpPr txBox="1"/>
           <p:nvPr/>
         </p:nvSpPr>
@@ -14046,10 +13946,136 @@
           </a:p>
         </p:txBody>
       </p:sp>
+      <p:sp>
+        <p:nvSpPr>
+          <p:cNvPr id="6" name="TextBox 5"/>
+          <p:cNvSpPr txBox="1"/>
+          <p:nvPr/>
+        </p:nvSpPr>
+        <p:spPr>
+          <a:xfrm>
+            <a:off x="525977" y="4913116"/>
+            <a:ext cx="4578176" cy="738664"/>
+          </a:xfrm>
+          <a:prstGeom prst="rect">
+            <a:avLst/>
+          </a:prstGeom>
+          <a:noFill/>
+        </p:spPr>
+        <p:txBody>
+          <a:bodyPr wrap="none" lIns="0" tIns="0" rIns="0" bIns="0" rtlCol="0">
+            <a:spAutoFit/>
+          </a:bodyPr>
+          <a:lstStyle/>
+          <a:p>
+            <a:r>
+              <a:rPr lang="en-US" sz="2400" dirty="0">
+                <a:gradFill>
+                  <a:gsLst>
+                    <a:gs pos="0">
+                      <a:schemeClr val="tx1"/>
+                    </a:gs>
+                    <a:gs pos="86000">
+                      <a:schemeClr val="tx1"/>
+                    </a:gs>
+                  </a:gsLst>
+                  <a:lin ang="5400000" scaled="0"/>
+                </a:gradFill>
+                <a:latin typeface="Segoe UI Light" pitchFamily="34" charset="0"/>
+              </a:rPr>
+              <a:t>http://</a:t>
+            </a:r>
+            <a:r>
+              <a:rPr lang="en-US" sz="2400" dirty="0" err="1">
+                <a:gradFill>
+                  <a:gsLst>
+                    <a:gs pos="0">
+                      <a:schemeClr val="tx1"/>
+                    </a:gs>
+                    <a:gs pos="86000">
+                      <a:schemeClr val="tx1"/>
+                    </a:gs>
+                  </a:gsLst>
+                  <a:lin ang="5400000" scaled="0"/>
+                </a:gradFill>
+                <a:latin typeface="Segoe UI Light" pitchFamily="34" charset="0"/>
+              </a:rPr>
+              <a:t>gotwarlost.github.io</a:t>
+            </a:r>
+            <a:r>
+              <a:rPr lang="en-US" sz="2400" dirty="0">
+                <a:gradFill>
+                  <a:gsLst>
+                    <a:gs pos="0">
+                      <a:schemeClr val="tx1"/>
+                    </a:gs>
+                    <a:gs pos="86000">
+                      <a:schemeClr val="tx1"/>
+                    </a:gs>
+                  </a:gsLst>
+                  <a:lin ang="5400000" scaled="0"/>
+                </a:gradFill>
+                <a:latin typeface="Segoe UI Light" pitchFamily="34" charset="0"/>
+              </a:rPr>
+              <a:t>/</a:t>
+            </a:r>
+            <a:r>
+              <a:rPr lang="en-US" sz="2400" dirty="0" err="1">
+                <a:gradFill>
+                  <a:gsLst>
+                    <a:gs pos="0">
+                      <a:schemeClr val="tx1"/>
+                    </a:gs>
+                    <a:gs pos="86000">
+                      <a:schemeClr val="tx1"/>
+                    </a:gs>
+                  </a:gsLst>
+                  <a:lin ang="5400000" scaled="0"/>
+                </a:gradFill>
+                <a:latin typeface="Segoe UI Light" pitchFamily="34" charset="0"/>
+              </a:rPr>
+              <a:t>istanbul</a:t>
+            </a:r>
+            <a:r>
+              <a:rPr lang="en-US" sz="2400" dirty="0">
+                <a:gradFill>
+                  <a:gsLst>
+                    <a:gs pos="0">
+                      <a:schemeClr val="tx1"/>
+                    </a:gs>
+                    <a:gs pos="86000">
+                      <a:schemeClr val="tx1"/>
+                    </a:gs>
+                  </a:gsLst>
+                  <a:lin ang="5400000" scaled="0"/>
+                </a:gradFill>
+                <a:latin typeface="Segoe UI Light" pitchFamily="34" charset="0"/>
+              </a:rPr>
+              <a:t>/</a:t>
+            </a:r>
+          </a:p>
+          <a:p>
+            <a:endParaRPr lang="en-US" sz="2400" dirty="0" err="1" smtClean="0">
+              <a:gradFill>
+                <a:gsLst>
+                  <a:gs pos="0">
+                    <a:schemeClr val="tx1"/>
+                  </a:gs>
+                  <a:gs pos="86000">
+                    <a:schemeClr val="tx1"/>
+                  </a:gs>
+                </a:gsLst>
+                <a:lin ang="5400000" scaled="0"/>
+              </a:gradFill>
+              <a:latin typeface="Segoe UI Light" pitchFamily="34" charset="0"/>
+            </a:endParaRPr>
+          </a:p>
+        </p:txBody>
+      </p:sp>
     </p:spTree>
     <p:extLst>
       <p:ext uri="{BB962C8B-B14F-4D97-AF65-F5344CB8AC3E}">
-        <p14:creationId xmlns:p14="http://schemas.microsoft.com/office/powerpoint/2010/main" val="261083962"/>
+        <p14:creationId xmlns:p14="http://schemas.microsoft.com/office/powerpoint/2010/main" val="2012525684"/>
       </p:ext>
     </p:extLst>
   </p:cSld>
@@ -14091,111 +14117,9 @@
           <a:chExt cx="0" cy="0"/>
         </a:xfrm>
       </p:grpSpPr>
-      <p:pic>
-        <p:nvPicPr>
-          <p:cNvPr id="2" name="Picture 1" descr="plato_screenshot.png"/>
-          <p:cNvPicPr>
-            <a:picLocks noChangeAspect="1"/>
-          </p:cNvPicPr>
-          <p:nvPr/>
-        </p:nvPicPr>
-        <p:blipFill rotWithShape="1">
-          <a:blip r:embed="rId3">
-            <a:extLst>
-              <a:ext uri="{28A0092B-C50C-407E-A947-70E740481C1C}">
-                <a14:useLocalDpi xmlns:a14="http://schemas.microsoft.com/office/drawing/2010/main" val="0"/>
-              </a:ext>
-            </a:extLst>
-          </a:blip>
-          <a:srcRect l="1925" t="21876" r="50270"/>
-          <a:stretch/>
-        </p:blipFill>
-        <p:spPr>
-          <a:xfrm>
-            <a:off x="6003810" y="1090375"/>
-            <a:ext cx="5734408" cy="5222577"/>
-          </a:xfrm>
-          <a:prstGeom prst="rect">
-            <a:avLst/>
-          </a:prstGeom>
-        </p:spPr>
-      </p:pic>
       <p:sp>
         <p:nvSpPr>
-          <p:cNvPr id="3" name="TextBox 2"/>
-          <p:cNvSpPr txBox="1"/>
-          <p:nvPr/>
-        </p:nvSpPr>
-        <p:spPr>
-          <a:xfrm>
-            <a:off x="10455353" y="218075"/>
-            <a:ext cx="1574074" cy="307777"/>
-          </a:xfrm>
-          <a:prstGeom prst="rect">
-            <a:avLst/>
-          </a:prstGeom>
-          <a:noFill/>
-        </p:spPr>
-        <p:txBody>
-          <a:bodyPr wrap="none" lIns="0" tIns="0" rIns="0" bIns="0" rtlCol="0">
-            <a:spAutoFit/>
-          </a:bodyPr>
-          <a:lstStyle/>
-          <a:p>
-            <a:r>
-              <a:rPr lang="en-US" sz="2000" dirty="0" smtClean="0">
-                <a:gradFill>
-                  <a:gsLst>
-                    <a:gs pos="0">
-                      <a:schemeClr val="tx1"/>
-                    </a:gs>
-                    <a:gs pos="86000">
-                      <a:schemeClr val="tx1"/>
-                    </a:gs>
-                  </a:gsLst>
-                  <a:lin ang="5400000" scaled="0"/>
-                </a:gradFill>
-                <a:latin typeface="Segoe UI Light" pitchFamily="34" charset="0"/>
-              </a:rPr>
-              <a:t>#</a:t>
-            </a:r>
-            <a:r>
-              <a:rPr lang="en-US" sz="2000" dirty="0" err="1" smtClean="0">
-                <a:gradFill>
-                  <a:gsLst>
-                    <a:gs pos="0">
-                      <a:schemeClr val="tx1"/>
-                    </a:gs>
-                    <a:gs pos="86000">
-                      <a:schemeClr val="tx1"/>
-                    </a:gs>
-                  </a:gsLst>
-                  <a:lin ang="5400000" scaled="0"/>
-                </a:gradFill>
-                <a:latin typeface="Segoe UI Light" pitchFamily="34" charset="0"/>
-              </a:rPr>
-              <a:t>sjsSugendran</a:t>
-            </a:r>
-            <a:endParaRPr lang="en-US" sz="2000" dirty="0" smtClean="0">
-              <a:gradFill>
-                <a:gsLst>
-                  <a:gs pos="0">
-                    <a:schemeClr val="tx1"/>
-                  </a:gs>
-                  <a:gs pos="86000">
-                    <a:schemeClr val="tx1"/>
-                  </a:gs>
-                </a:gsLst>
-                <a:lin ang="5400000" scaled="0"/>
-              </a:gradFill>
-              <a:latin typeface="Segoe UI Light" pitchFamily="34" charset="0"/>
-            </a:endParaRPr>
-          </a:p>
-        </p:txBody>
-      </p:sp>
-      <p:sp>
-        <p:nvSpPr>
-          <p:cNvPr id="4" name="Rectangle 3"/>
+          <p:cNvPr id="6" name="Rectangle 3"/>
           <p:cNvSpPr txBox="1">
             <a:spLocks noChangeArrowheads="1"/>
           </p:cNvSpPr>
@@ -14203,7 +14127,7 @@
         </p:nvSpPr>
         <p:spPr>
           <a:xfrm>
-            <a:off x="512763" y="4041437"/>
+            <a:off x="512763" y="975545"/>
             <a:ext cx="11694722" cy="846386"/>
           </a:xfrm>
           <a:prstGeom prst="rect">
@@ -14225,7 +14149,7 @@
               </a:spcBef>
               <a:buFontTx/>
               <a:buBlip>
-                <a:blip r:embed="rId4"/>
+                <a:blip r:embed="rId3"/>
               </a:buBlip>
               <a:defRPr sz="3200" kern="1200">
                 <a:gradFill>
@@ -14253,7 +14177,7 @@
               </a:spcBef>
               <a:buFontTx/>
               <a:buBlip>
-                <a:blip r:embed="rId5"/>
+                <a:blip r:embed="rId4"/>
               </a:buBlip>
               <a:defRPr sz="2800" kern="1200">
                 <a:gradFill>
@@ -14281,7 +14205,7 @@
               </a:spcBef>
               <a:buFontTx/>
               <a:buBlip>
-                <a:blip r:embed="rId5"/>
+                <a:blip r:embed="rId4"/>
               </a:buBlip>
               <a:defRPr sz="2400" kern="1200">
                 <a:gradFill>
@@ -14309,7 +14233,7 @@
               </a:spcBef>
               <a:buFontTx/>
               <a:buBlip>
-                <a:blip r:embed="rId5"/>
+                <a:blip r:embed="rId4"/>
               </a:buBlip>
               <a:defRPr sz="2000" kern="1200">
                 <a:gradFill>
@@ -14337,7 +14261,7 @@
               </a:spcBef>
               <a:buFontTx/>
               <a:buBlip>
-                <a:blip r:embed="rId5"/>
+                <a:blip r:embed="rId4"/>
               </a:buBlip>
               <a:defRPr sz="2000" kern="1200">
                 <a:gradFill>
@@ -14443,7 +14367,7 @@
                 <a:latin typeface="+mj-lt"/>
                 <a:cs typeface="Arial" charset="0"/>
               </a:rPr>
-              <a:t>Plato</a:t>
+              <a:t>Think about the API</a:t>
             </a:r>
             <a:endParaRPr lang="en-US" sz="6000" spc="-100" dirty="0">
               <a:ln w="3175">
@@ -14468,14 +14392,14 @@
       </p:sp>
       <p:sp>
         <p:nvSpPr>
-          <p:cNvPr id="5" name="TextBox 4"/>
+          <p:cNvPr id="3" name="TextBox 2"/>
           <p:cNvSpPr txBox="1"/>
           <p:nvPr/>
         </p:nvSpPr>
         <p:spPr>
           <a:xfrm>
-            <a:off x="525977" y="4913116"/>
-            <a:ext cx="2156690" cy="738664"/>
+            <a:off x="602947" y="2655385"/>
+            <a:ext cx="7822654" cy="615553"/>
           </a:xfrm>
           <a:prstGeom prst="rect">
             <a:avLst/>
@@ -14489,7 +14413,7 @@
           <a:lstStyle/>
           <a:p>
             <a:r>
-              <a:rPr lang="en-US" sz="2400" dirty="0">
+              <a:rPr lang="en-US" sz="4000" dirty="0" smtClean="0">
                 <a:gradFill>
                   <a:gsLst>
                     <a:gs pos="0">
@@ -14503,10 +14427,35 @@
                 </a:gradFill>
                 <a:latin typeface="Segoe UI Light" pitchFamily="34" charset="0"/>
               </a:rPr>
-              <a:t>http://</a:t>
-            </a:r>
-            <a:r>
-              <a:rPr lang="en-US" sz="2400" dirty="0" err="1">
+              <a:t>How will others use this component?</a:t>
+            </a:r>
+          </a:p>
+        </p:txBody>
+      </p:sp>
+      <p:sp>
+        <p:nvSpPr>
+          <p:cNvPr id="7" name="TextBox 6"/>
+          <p:cNvSpPr txBox="1"/>
+          <p:nvPr/>
+        </p:nvSpPr>
+        <p:spPr>
+          <a:xfrm>
+            <a:off x="602947" y="3546927"/>
+            <a:ext cx="6307316" cy="615553"/>
+          </a:xfrm>
+          <a:prstGeom prst="rect">
+            <a:avLst/>
+          </a:prstGeom>
+          <a:noFill/>
+        </p:spPr>
+        <p:txBody>
+          <a:bodyPr wrap="none" lIns="0" tIns="0" rIns="0" bIns="0" rtlCol="0">
+            <a:spAutoFit/>
+          </a:bodyPr>
+          <a:lstStyle/>
+          <a:p>
+            <a:r>
+              <a:rPr lang="en-US" sz="4000" dirty="0">
                 <a:gradFill>
                   <a:gsLst>
                     <a:gs pos="0">
@@ -14520,9 +14469,110 @@
                 </a:gradFill>
                 <a:latin typeface="Segoe UI Light" pitchFamily="34" charset="0"/>
               </a:rPr>
-              <a:t>platojs.org</a:t>
-            </a:r>
-            <a:endParaRPr lang="en-US" sz="2400" dirty="0">
+              <a:t>Hack up different approaches</a:t>
+            </a:r>
+          </a:p>
+        </p:txBody>
+      </p:sp>
+      <p:sp>
+        <p:nvSpPr>
+          <p:cNvPr id="8" name="TextBox 7"/>
+          <p:cNvSpPr txBox="1"/>
+          <p:nvPr/>
+        </p:nvSpPr>
+        <p:spPr>
+          <a:xfrm>
+            <a:off x="602947" y="4438468"/>
+            <a:ext cx="8286523" cy="615553"/>
+          </a:xfrm>
+          <a:prstGeom prst="rect">
+            <a:avLst/>
+          </a:prstGeom>
+          <a:noFill/>
+        </p:spPr>
+        <p:txBody>
+          <a:bodyPr wrap="none" lIns="0" tIns="0" rIns="0" bIns="0" rtlCol="0">
+            <a:spAutoFit/>
+          </a:bodyPr>
+          <a:lstStyle/>
+          <a:p>
+            <a:r>
+              <a:rPr lang="en-US" sz="4000" dirty="0" smtClean="0">
+                <a:gradFill>
+                  <a:gsLst>
+                    <a:gs pos="0">
+                      <a:schemeClr val="tx1"/>
+                    </a:gs>
+                    <a:gs pos="86000">
+                      <a:schemeClr val="tx1"/>
+                    </a:gs>
+                  </a:gsLst>
+                  <a:lin ang="5400000" scaled="0"/>
+                </a:gradFill>
+                <a:latin typeface="Segoe UI Light" pitchFamily="34" charset="0"/>
+              </a:rPr>
+              <a:t>Be explicit – don’t repeat past mistakes</a:t>
+            </a:r>
+          </a:p>
+        </p:txBody>
+      </p:sp>
+      <p:sp>
+        <p:nvSpPr>
+          <p:cNvPr id="9" name="TextBox 8"/>
+          <p:cNvSpPr txBox="1"/>
+          <p:nvPr/>
+        </p:nvSpPr>
+        <p:spPr>
+          <a:xfrm>
+            <a:off x="10455353" y="218075"/>
+            <a:ext cx="1574074" cy="307777"/>
+          </a:xfrm>
+          <a:prstGeom prst="rect">
+            <a:avLst/>
+          </a:prstGeom>
+          <a:noFill/>
+        </p:spPr>
+        <p:txBody>
+          <a:bodyPr wrap="none" lIns="0" tIns="0" rIns="0" bIns="0" rtlCol="0">
+            <a:spAutoFit/>
+          </a:bodyPr>
+          <a:lstStyle/>
+          <a:p>
+            <a:r>
+              <a:rPr lang="en-US" sz="2000" dirty="0" smtClean="0">
+                <a:gradFill>
+                  <a:gsLst>
+                    <a:gs pos="0">
+                      <a:schemeClr val="tx1"/>
+                    </a:gs>
+                    <a:gs pos="86000">
+                      <a:schemeClr val="tx1"/>
+                    </a:gs>
+                  </a:gsLst>
+                  <a:lin ang="5400000" scaled="0"/>
+                </a:gradFill>
+                <a:latin typeface="Segoe UI Light" pitchFamily="34" charset="0"/>
+              </a:rPr>
+              <a:t>#</a:t>
+            </a:r>
+            <a:r>
+              <a:rPr lang="en-US" sz="2000" dirty="0" err="1" smtClean="0">
+                <a:gradFill>
+                  <a:gsLst>
+                    <a:gs pos="0">
+                      <a:schemeClr val="tx1"/>
+                    </a:gs>
+                    <a:gs pos="86000">
+                      <a:schemeClr val="tx1"/>
+                    </a:gs>
+                  </a:gsLst>
+                  <a:lin ang="5400000" scaled="0"/>
+                </a:gradFill>
+                <a:latin typeface="Segoe UI Light" pitchFamily="34" charset="0"/>
+              </a:rPr>
+              <a:t>sjsSugendran</a:t>
+            </a:r>
+            <a:endParaRPr lang="en-US" sz="2000" dirty="0" smtClean="0">
               <a:gradFill>
                 <a:gsLst>
                   <a:gs pos="0">
@@ -14537,28 +14587,12 @@
               <a:latin typeface="Segoe UI Light" pitchFamily="34" charset="0"/>
             </a:endParaRPr>
           </a:p>
-          <a:p>
-            <a:endParaRPr lang="en-US" sz="2400" dirty="0" err="1" smtClean="0">
-              <a:gradFill>
-                <a:gsLst>
-                  <a:gs pos="0">
-                    <a:schemeClr val="tx1"/>
-                  </a:gs>
-                  <a:gs pos="86000">
-                    <a:schemeClr val="tx1"/>
-                  </a:gs>
-                </a:gsLst>
-                <a:lin ang="5400000" scaled="0"/>
-              </a:gradFill>
-              <a:latin typeface="Segoe UI Light" pitchFamily="34" charset="0"/>
-            </a:endParaRPr>
-          </a:p>
         </p:txBody>
       </p:sp>
     </p:spTree>
     <p:extLst>
       <p:ext uri="{BB962C8B-B14F-4D97-AF65-F5344CB8AC3E}">
-        <p14:creationId xmlns:p14="http://schemas.microsoft.com/office/powerpoint/2010/main" val="1406159155"/>
+        <p14:creationId xmlns:p14="http://schemas.microsoft.com/office/powerpoint/2010/main" val="261083962"/>
       </p:ext>
     </p:extLst>
   </p:cSld>
@@ -14600,9 +14634,111 @@
           <a:chExt cx="0" cy="0"/>
         </a:xfrm>
       </p:grpSpPr>
+      <p:pic>
+        <p:nvPicPr>
+          <p:cNvPr id="2" name="Picture 1" descr="plato_screenshot.png"/>
+          <p:cNvPicPr>
+            <a:picLocks noChangeAspect="1"/>
+          </p:cNvPicPr>
+          <p:nvPr/>
+        </p:nvPicPr>
+        <p:blipFill rotWithShape="1">
+          <a:blip r:embed="rId3">
+            <a:extLst>
+              <a:ext uri="{28A0092B-C50C-407E-A947-70E740481C1C}">
+                <a14:useLocalDpi xmlns:a14="http://schemas.microsoft.com/office/drawing/2010/main" val="0"/>
+              </a:ext>
+            </a:extLst>
+          </a:blip>
+          <a:srcRect l="1925" t="21876" r="50270"/>
+          <a:stretch/>
+        </p:blipFill>
+        <p:spPr>
+          <a:xfrm>
+            <a:off x="6003810" y="1090375"/>
+            <a:ext cx="5734408" cy="5222577"/>
+          </a:xfrm>
+          <a:prstGeom prst="rect">
+            <a:avLst/>
+          </a:prstGeom>
+        </p:spPr>
+      </p:pic>
       <p:sp>
         <p:nvSpPr>
-          <p:cNvPr id="6" name="Rectangle 3"/>
+          <p:cNvPr id="3" name="TextBox 2"/>
+          <p:cNvSpPr txBox="1"/>
+          <p:nvPr/>
+        </p:nvSpPr>
+        <p:spPr>
+          <a:xfrm>
+            <a:off x="10455353" y="218075"/>
+            <a:ext cx="1574074" cy="307777"/>
+          </a:xfrm>
+          <a:prstGeom prst="rect">
+            <a:avLst/>
+          </a:prstGeom>
+          <a:noFill/>
+        </p:spPr>
+        <p:txBody>
+          <a:bodyPr wrap="none" lIns="0" tIns="0" rIns="0" bIns="0" rtlCol="0">
+            <a:spAutoFit/>
+          </a:bodyPr>
+          <a:lstStyle/>
+          <a:p>
+            <a:r>
+              <a:rPr lang="en-US" sz="2000" dirty="0" smtClean="0">
+                <a:gradFill>
+                  <a:gsLst>
+                    <a:gs pos="0">
+                      <a:schemeClr val="tx1"/>
+                    </a:gs>
+                    <a:gs pos="86000">
+                      <a:schemeClr val="tx1"/>
+                    </a:gs>
+                  </a:gsLst>
+                  <a:lin ang="5400000" scaled="0"/>
+                </a:gradFill>
+                <a:latin typeface="Segoe UI Light" pitchFamily="34" charset="0"/>
+              </a:rPr>
+              <a:t>#</a:t>
+            </a:r>
+            <a:r>
+              <a:rPr lang="en-US" sz="2000" dirty="0" err="1" smtClean="0">
+                <a:gradFill>
+                  <a:gsLst>
+                    <a:gs pos="0">
+                      <a:schemeClr val="tx1"/>
+                    </a:gs>
+                    <a:gs pos="86000">
+                      <a:schemeClr val="tx1"/>
+                    </a:gs>
+                  </a:gsLst>
+                  <a:lin ang="5400000" scaled="0"/>
+                </a:gradFill>
+                <a:latin typeface="Segoe UI Light" pitchFamily="34" charset="0"/>
+              </a:rPr>
+              <a:t>sjsSugendran</a:t>
+            </a:r>
+            <a:endParaRPr lang="en-US" sz="2000" dirty="0" smtClean="0">
+              <a:gradFill>
+                <a:gsLst>
+                  <a:gs pos="0">
+                    <a:schemeClr val="tx1"/>
+                  </a:gs>
+                  <a:gs pos="86000">
+                    <a:schemeClr val="tx1"/>
+                  </a:gs>
+                </a:gsLst>
+                <a:lin ang="5400000" scaled="0"/>
+              </a:gradFill>
+              <a:latin typeface="Segoe UI Light" pitchFamily="34" charset="0"/>
+            </a:endParaRPr>
+          </a:p>
+        </p:txBody>
+      </p:sp>
+      <p:sp>
+        <p:nvSpPr>
+          <p:cNvPr id="4" name="Rectangle 3"/>
           <p:cNvSpPr txBox="1">
             <a:spLocks noChangeArrowheads="1"/>
           </p:cNvSpPr>
@@ -14610,7 +14746,7 @@
         </p:nvSpPr>
         <p:spPr>
           <a:xfrm>
-            <a:off x="512763" y="975545"/>
+            <a:off x="512763" y="4041437"/>
             <a:ext cx="11694722" cy="846386"/>
           </a:xfrm>
           <a:prstGeom prst="rect">
@@ -14632,7 +14768,7 @@
               </a:spcBef>
               <a:buFontTx/>
               <a:buBlip>
-                <a:blip r:embed="rId3"/>
+                <a:blip r:embed="rId4"/>
               </a:buBlip>
               <a:defRPr sz="3200" kern="1200">
                 <a:gradFill>
@@ -14660,7 +14796,7 @@
               </a:spcBef>
               <a:buFontTx/>
               <a:buBlip>
-                <a:blip r:embed="rId4"/>
+                <a:blip r:embed="rId5"/>
               </a:buBlip>
               <a:defRPr sz="2800" kern="1200">
                 <a:gradFill>
@@ -14688,7 +14824,7 @@
               </a:spcBef>
               <a:buFontTx/>
               <a:buBlip>
-                <a:blip r:embed="rId4"/>
+                <a:blip r:embed="rId5"/>
               </a:buBlip>
               <a:defRPr sz="2400" kern="1200">
                 <a:gradFill>
@@ -14716,7 +14852,7 @@
               </a:spcBef>
               <a:buFontTx/>
               <a:buBlip>
-                <a:blip r:embed="rId4"/>
+                <a:blip r:embed="rId5"/>
               </a:buBlip>
               <a:defRPr sz="2000" kern="1200">
                 <a:gradFill>
@@ -14744,7 +14880,7 @@
               </a:spcBef>
               <a:buFontTx/>
               <a:buBlip>
-                <a:blip r:embed="rId4"/>
+                <a:blip r:embed="rId5"/>
               </a:buBlip>
               <a:defRPr sz="2000" kern="1200">
                 <a:gradFill>
@@ -14850,7 +14986,7 @@
                 <a:latin typeface="+mj-lt"/>
                 <a:cs typeface="Arial" charset="0"/>
               </a:rPr>
-              <a:t>Keep the team in the loop</a:t>
+              <a:t>Plato</a:t>
             </a:r>
             <a:endParaRPr lang="en-US" sz="6000" spc="-100" dirty="0">
               <a:ln w="3175">
@@ -14875,14 +15011,14 @@
       </p:sp>
       <p:sp>
         <p:nvSpPr>
-          <p:cNvPr id="3" name="TextBox 2"/>
+          <p:cNvPr id="5" name="TextBox 4"/>
           <p:cNvSpPr txBox="1"/>
           <p:nvPr/>
         </p:nvSpPr>
         <p:spPr>
           <a:xfrm>
-            <a:off x="602947" y="2655385"/>
-            <a:ext cx="6127980" cy="615553"/>
+            <a:off x="525977" y="4913116"/>
+            <a:ext cx="2156690" cy="738664"/>
           </a:xfrm>
           <a:prstGeom prst="rect">
             <a:avLst/>
@@ -14896,7 +15032,7 @@
           <a:lstStyle/>
           <a:p>
             <a:r>
-              <a:rPr lang="en-US" sz="4000" dirty="0" smtClean="0">
+              <a:rPr lang="en-US" sz="2400" dirty="0">
                 <a:gradFill>
                   <a:gsLst>
                     <a:gs pos="0">
@@ -14910,35 +15046,10 @@
                 </a:gradFill>
                 <a:latin typeface="Segoe UI Light" pitchFamily="34" charset="0"/>
               </a:rPr>
-              <a:t>Get feedback before starting</a:t>
-            </a:r>
-          </a:p>
-        </p:txBody>
-      </p:sp>
-      <p:sp>
-        <p:nvSpPr>
-          <p:cNvPr id="7" name="TextBox 6"/>
-          <p:cNvSpPr txBox="1"/>
-          <p:nvPr/>
-        </p:nvSpPr>
-        <p:spPr>
-          <a:xfrm>
-            <a:off x="602947" y="3546927"/>
-            <a:ext cx="7919085" cy="615553"/>
-          </a:xfrm>
-          <a:prstGeom prst="rect">
-            <a:avLst/>
-          </a:prstGeom>
-          <a:noFill/>
-        </p:spPr>
-        <p:txBody>
-          <a:bodyPr wrap="none" lIns="0" tIns="0" rIns="0" bIns="0" rtlCol="0">
-            <a:spAutoFit/>
-          </a:bodyPr>
-          <a:lstStyle/>
-          <a:p>
-            <a:r>
-              <a:rPr lang="en-US" sz="4000" dirty="0" smtClean="0">
+              <a:t>http://</a:t>
+            </a:r>
+            <a:r>
+              <a:rPr lang="en-US" sz="2400" dirty="0" err="1">
                 <a:gradFill>
                   <a:gsLst>
                     <a:gs pos="0">
@@ -14952,9 +15063,9 @@
                 </a:gradFill>
                 <a:latin typeface="Segoe UI Light" pitchFamily="34" charset="0"/>
               </a:rPr>
-              <a:t>Share the spec and answer questions</a:t>
-            </a:r>
-            <a:endParaRPr lang="en-US" sz="4000" dirty="0">
+              <a:t>platojs.org</a:t>
+            </a:r>
+            <a:endParaRPr lang="en-US" sz="2400" dirty="0">
               <a:gradFill>
                 <a:gsLst>
                   <a:gs pos="0">
@@ -14969,107 +15080,8 @@
               <a:latin typeface="Segoe UI Light" pitchFamily="34" charset="0"/>
             </a:endParaRPr>
           </a:p>
-        </p:txBody>
-      </p:sp>
-      <p:sp>
-        <p:nvSpPr>
-          <p:cNvPr id="8" name="TextBox 7"/>
-          <p:cNvSpPr txBox="1"/>
-          <p:nvPr/>
-        </p:nvSpPr>
-        <p:spPr>
-          <a:xfrm>
-            <a:off x="602947" y="4438468"/>
-            <a:ext cx="8890405" cy="615553"/>
-          </a:xfrm>
-          <a:prstGeom prst="rect">
-            <a:avLst/>
-          </a:prstGeom>
-          <a:noFill/>
-        </p:spPr>
-        <p:txBody>
-          <a:bodyPr wrap="none" lIns="0" tIns="0" rIns="0" bIns="0" rtlCol="0">
-            <a:spAutoFit/>
-          </a:bodyPr>
-          <a:lstStyle/>
-          <a:p>
-            <a:r>
-              <a:rPr lang="en-US" sz="4000" dirty="0" smtClean="0">
-                <a:gradFill>
-                  <a:gsLst>
-                    <a:gs pos="0">
-                      <a:schemeClr val="tx1"/>
-                    </a:gs>
-                    <a:gs pos="86000">
-                      <a:schemeClr val="tx1"/>
-                    </a:gs>
-                  </a:gsLst>
-                  <a:lin ang="5400000" scaled="0"/>
-                </a:gradFill>
-                <a:latin typeface="Segoe UI Light" pitchFamily="34" charset="0"/>
-              </a:rPr>
-              <a:t>Everyone should understand the changes</a:t>
-            </a:r>
-          </a:p>
-        </p:txBody>
-      </p:sp>
-      <p:sp>
-        <p:nvSpPr>
-          <p:cNvPr id="9" name="TextBox 8"/>
-          <p:cNvSpPr txBox="1"/>
-          <p:nvPr/>
-        </p:nvSpPr>
-        <p:spPr>
-          <a:xfrm>
-            <a:off x="10455353" y="218075"/>
-            <a:ext cx="1574074" cy="307777"/>
-          </a:xfrm>
-          <a:prstGeom prst="rect">
-            <a:avLst/>
-          </a:prstGeom>
-          <a:noFill/>
-        </p:spPr>
-        <p:txBody>
-          <a:bodyPr wrap="none" lIns="0" tIns="0" rIns="0" bIns="0" rtlCol="0">
-            <a:spAutoFit/>
-          </a:bodyPr>
-          <a:lstStyle/>
-          <a:p>
-            <a:r>
-              <a:rPr lang="en-US" sz="2000" dirty="0" smtClean="0">
-                <a:gradFill>
-                  <a:gsLst>
-                    <a:gs pos="0">
-                      <a:schemeClr val="tx1"/>
-                    </a:gs>
-                    <a:gs pos="86000">
-                      <a:schemeClr val="tx1"/>
-                    </a:gs>
-                  </a:gsLst>
-                  <a:lin ang="5400000" scaled="0"/>
-                </a:gradFill>
-                <a:latin typeface="Segoe UI Light" pitchFamily="34" charset="0"/>
-              </a:rPr>
-              <a:t>#</a:t>
-            </a:r>
-            <a:r>
-              <a:rPr lang="en-US" sz="2000" dirty="0" err="1" smtClean="0">
-                <a:gradFill>
-                  <a:gsLst>
-                    <a:gs pos="0">
-                      <a:schemeClr val="tx1"/>
-                    </a:gs>
-                    <a:gs pos="86000">
-                      <a:schemeClr val="tx1"/>
-                    </a:gs>
-                  </a:gsLst>
-                  <a:lin ang="5400000" scaled="0"/>
-                </a:gradFill>
-                <a:latin typeface="Segoe UI Light" pitchFamily="34" charset="0"/>
-              </a:rPr>
-              <a:t>sjsSugendran</a:t>
-            </a:r>
-            <a:endParaRPr lang="en-US" sz="2000" dirty="0" smtClean="0">
+          <a:p>
+            <a:endParaRPr lang="en-US" sz="2400" dirty="0" err="1" smtClean="0">
               <a:gradFill>
                 <a:gsLst>
                   <a:gs pos="0">
@@ -15089,7 +15101,7 @@
     </p:spTree>
     <p:extLst>
       <p:ext uri="{BB962C8B-B14F-4D97-AF65-F5344CB8AC3E}">
-        <p14:creationId xmlns:p14="http://schemas.microsoft.com/office/powerpoint/2010/main" val="1408341408"/>
+        <p14:creationId xmlns:p14="http://schemas.microsoft.com/office/powerpoint/2010/main" val="1406159155"/>
       </p:ext>
     </p:extLst>
   </p:cSld>
@@ -19048,24 +19060,7 @@
                 </a:gradFill>
                 <a:latin typeface="Segoe UI Light" pitchFamily="34" charset="0"/>
               </a:rPr>
-              <a:t>Lots </a:t>
-            </a:r>
-            <a:r>
-              <a:rPr lang="en-US" sz="4000" dirty="0" smtClean="0">
-                <a:gradFill>
-                  <a:gsLst>
-                    <a:gs pos="0">
-                      <a:schemeClr val="tx1"/>
-                    </a:gs>
-                    <a:gs pos="86000">
-                      <a:schemeClr val="tx1"/>
-                    </a:gs>
-                  </a:gsLst>
-                  <a:lin ang="5400000" scaled="0"/>
-                </a:gradFill>
-                <a:latin typeface="Segoe UI Light" pitchFamily="34" charset="0"/>
-              </a:rPr>
-              <a:t>of experimentation</a:t>
+              <a:t>Lots of experimentation</a:t>
             </a:r>
           </a:p>
         </p:txBody>
@@ -19107,39 +19102,8 @@
                 </a:gradFill>
                 <a:latin typeface="Segoe UI Light" pitchFamily="34" charset="0"/>
               </a:rPr>
-              <a:t>Hard to </a:t>
-            </a:r>
-            <a:r>
-              <a:rPr lang="en-US" sz="4000" dirty="0" smtClean="0">
-                <a:gradFill>
-                  <a:gsLst>
-                    <a:gs pos="0">
-                      <a:schemeClr val="tx1"/>
-                    </a:gs>
-                    <a:gs pos="86000">
-                      <a:schemeClr val="tx1"/>
-                    </a:gs>
-                  </a:gsLst>
-                  <a:lin ang="5400000" scaled="0"/>
-                </a:gradFill>
-                <a:latin typeface="Segoe UI Light" pitchFamily="34" charset="0"/>
-              </a:rPr>
-              <a:t>understand</a:t>
-            </a:r>
-            <a:endParaRPr lang="en-US" sz="4000" dirty="0" smtClean="0">
-              <a:gradFill>
-                <a:gsLst>
-                  <a:gs pos="0">
-                    <a:schemeClr val="tx1"/>
-                  </a:gs>
-                  <a:gs pos="86000">
-                    <a:schemeClr val="tx1"/>
-                  </a:gs>
-                </a:gsLst>
-                <a:lin ang="5400000" scaled="0"/>
-              </a:gradFill>
-              <a:latin typeface="Segoe UI Light" pitchFamily="34" charset="0"/>
-            </a:endParaRPr>
+              <a:t>Hard to understand</a:t>
+            </a:r>
           </a:p>
         </p:txBody>
       </p:sp>
@@ -21826,49 +21790,7 @@
                 <a:latin typeface="+mj-lt"/>
                 <a:cs typeface="Arial" charset="0"/>
               </a:rPr>
-              <a:t>Release early, </a:t>
-            </a:r>
-            <a:r>
-              <a:rPr lang="en-US" sz="6000" spc="-100" dirty="0">
-                <a:ln w="3175">
-                  <a:noFill/>
-                </a:ln>
-                <a:gradFill>
-                  <a:gsLst>
-                    <a:gs pos="96667">
-                      <a:srgbClr val="FFFFFF"/>
-                    </a:gs>
-                    <a:gs pos="90000">
-                      <a:srgbClr val="FFFFFF"/>
-                    </a:gs>
-                  </a:gsLst>
-                  <a:lin ang="5400000" scaled="0"/>
-                </a:gradFill>
-                <a:latin typeface="+mj-lt"/>
-                <a:cs typeface="Arial" charset="0"/>
-              </a:rPr>
-              <a:t>r</a:t>
-            </a:r>
-            <a:r>
-              <a:rPr lang="en-US" sz="6000" spc="-100" dirty="0" smtClean="0">
-                <a:ln w="3175">
-                  <a:noFill/>
-                </a:ln>
-                <a:gradFill>
-                  <a:gsLst>
-                    <a:gs pos="96667">
-                      <a:srgbClr val="FFFFFF"/>
-                    </a:gs>
-                    <a:gs pos="90000">
-                      <a:srgbClr val="FFFFFF"/>
-                    </a:gs>
-                  </a:gsLst>
-                  <a:lin ang="5400000" scaled="0"/>
-                </a:gradFill>
-                <a:latin typeface="+mj-lt"/>
-                <a:cs typeface="Arial" charset="0"/>
-              </a:rPr>
-              <a:t>elease often</a:t>
+              <a:t>Keep the team in the loop</a:t>
             </a:r>
             <a:endParaRPr lang="en-US" sz="6000" spc="-100" dirty="0">
               <a:ln w="3175">
@@ -21900,7 +21822,7 @@
         <p:spPr>
           <a:xfrm>
             <a:off x="602947" y="2655385"/>
-            <a:ext cx="7253087" cy="615553"/>
+            <a:ext cx="6127980" cy="615553"/>
           </a:xfrm>
           <a:prstGeom prst="rect">
             <a:avLst/>
@@ -21928,7 +21850,7 @@
                 </a:gradFill>
                 <a:latin typeface="Segoe UI Light" pitchFamily="34" charset="0"/>
               </a:rPr>
-              <a:t>Get into master as fast as possible</a:t>
+              <a:t>Get feedback before starting</a:t>
             </a:r>
           </a:p>
         </p:txBody>
@@ -21942,7 +21864,7 @@
         <p:spPr>
           <a:xfrm>
             <a:off x="602947" y="3546927"/>
-            <a:ext cx="3916337" cy="615553"/>
+            <a:ext cx="7919085" cy="615553"/>
           </a:xfrm>
           <a:prstGeom prst="rect">
             <a:avLst/>
@@ -21970,8 +21892,22 @@
                 </a:gradFill>
                 <a:latin typeface="Segoe UI Light" pitchFamily="34" charset="0"/>
               </a:rPr>
-              <a:t>Use a feature gate</a:t>
-            </a:r>
+              <a:t>Share the spec and answer questions</a:t>
+            </a:r>
+            <a:endParaRPr lang="en-US" sz="4000" dirty="0">
+              <a:gradFill>
+                <a:gsLst>
+                  <a:gs pos="0">
+                    <a:schemeClr val="tx1"/>
+                  </a:gs>
+                  <a:gs pos="86000">
+                    <a:schemeClr val="tx1"/>
+                  </a:gs>
+                </a:gsLst>
+                <a:lin ang="5400000" scaled="0"/>
+              </a:gradFill>
+              <a:latin typeface="Segoe UI Light" pitchFamily="34" charset="0"/>
+            </a:endParaRPr>
           </a:p>
         </p:txBody>
       </p:sp>
@@ -21984,7 +21920,7 @@
         <p:spPr>
           <a:xfrm>
             <a:off x="602947" y="4438468"/>
-            <a:ext cx="8572308" cy="615553"/>
+            <a:ext cx="8890405" cy="615553"/>
           </a:xfrm>
           <a:prstGeom prst="rect">
             <a:avLst/>
@@ -22012,7 +21948,7 @@
                 </a:gradFill>
                 <a:latin typeface="Segoe UI Light" pitchFamily="34" charset="0"/>
               </a:rPr>
-              <a:t>Allows the team to be aware of changes</a:t>
+              <a:t>Everyone should understand the changes</a:t>
             </a:r>
           </a:p>
         </p:txBody>
@@ -22093,7 +22029,7 @@
     </p:spTree>
     <p:extLst>
       <p:ext uri="{BB962C8B-B14F-4D97-AF65-F5344CB8AC3E}">
-        <p14:creationId xmlns:p14="http://schemas.microsoft.com/office/powerpoint/2010/main" val="2903904270"/>
+        <p14:creationId xmlns:p14="http://schemas.microsoft.com/office/powerpoint/2010/main" val="1408341408"/>
       </p:ext>
     </p:extLst>
   </p:cSld>
@@ -22385,7 +22321,49 @@
                 <a:latin typeface="+mj-lt"/>
                 <a:cs typeface="Arial" charset="0"/>
               </a:rPr>
-              <a:t>Fork the tests</a:t>
+              <a:t>Release early, </a:t>
+            </a:r>
+            <a:r>
+              <a:rPr lang="en-US" sz="6000" spc="-100" dirty="0">
+                <a:ln w="3175">
+                  <a:noFill/>
+                </a:ln>
+                <a:gradFill>
+                  <a:gsLst>
+                    <a:gs pos="96667">
+                      <a:srgbClr val="FFFFFF"/>
+                    </a:gs>
+                    <a:gs pos="90000">
+                      <a:srgbClr val="FFFFFF"/>
+                    </a:gs>
+                  </a:gsLst>
+                  <a:lin ang="5400000" scaled="0"/>
+                </a:gradFill>
+                <a:latin typeface="+mj-lt"/>
+                <a:cs typeface="Arial" charset="0"/>
+              </a:rPr>
+              <a:t>r</a:t>
+            </a:r>
+            <a:r>
+              <a:rPr lang="en-US" sz="6000" spc="-100" dirty="0" smtClean="0">
+                <a:ln w="3175">
+                  <a:noFill/>
+                </a:ln>
+                <a:gradFill>
+                  <a:gsLst>
+                    <a:gs pos="96667">
+                      <a:srgbClr val="FFFFFF"/>
+                    </a:gs>
+                    <a:gs pos="90000">
+                      <a:srgbClr val="FFFFFF"/>
+                    </a:gs>
+                  </a:gsLst>
+                  <a:lin ang="5400000" scaled="0"/>
+                </a:gradFill>
+                <a:latin typeface="+mj-lt"/>
+                <a:cs typeface="Arial" charset="0"/>
+              </a:rPr>
+              <a:t>elease often</a:t>
             </a:r>
             <a:endParaRPr lang="en-US" sz="6000" spc="-100" dirty="0">
               <a:ln w="3175">
@@ -22417,7 +22395,7 @@
         <p:spPr>
           <a:xfrm>
             <a:off x="602947" y="2655385"/>
-            <a:ext cx="5435432" cy="615553"/>
+            <a:ext cx="7253087" cy="615553"/>
           </a:xfrm>
           <a:prstGeom prst="rect">
             <a:avLst/>
@@ -22445,7 +22423,7 @@
                 </a:gradFill>
                 <a:latin typeface="Segoe UI Light" pitchFamily="34" charset="0"/>
               </a:rPr>
-              <a:t>Tests give you confidence</a:t>
+              <a:t>Get into master as fast as possible</a:t>
             </a:r>
           </a:p>
         </p:txBody>
@@ -22459,7 +22437,7 @@
         <p:spPr>
           <a:xfrm>
             <a:off x="602947" y="3546927"/>
-            <a:ext cx="8436805" cy="615553"/>
+            <a:ext cx="3916337" cy="615553"/>
           </a:xfrm>
           <a:prstGeom prst="rect">
             <a:avLst/>
@@ -22487,7 +22465,7 @@
                 </a:gradFill>
                 <a:latin typeface="Segoe UI Light" pitchFamily="34" charset="0"/>
               </a:rPr>
-              <a:t>Spent the last year getting coverage up</a:t>
+              <a:t>Use a feature gate</a:t>
             </a:r>
           </a:p>
         </p:txBody>
@@ -22501,7 +22479,7 @@
         <p:spPr>
           <a:xfrm>
             <a:off x="602947" y="4438468"/>
-            <a:ext cx="6556032" cy="615553"/>
+            <a:ext cx="8572308" cy="615553"/>
           </a:xfrm>
           <a:prstGeom prst="rect">
             <a:avLst/>
@@ -22529,7 +22507,7 @@
                 </a:gradFill>
                 <a:latin typeface="Segoe UI Light" pitchFamily="34" charset="0"/>
               </a:rPr>
-              <a:t>You can’t refactor without tests</a:t>
+              <a:t>Allows the team to be aware of changes</a:t>
             </a:r>
           </a:p>
         </p:txBody>
@@ -22610,7 +22588,7 @@
     </p:spTree>
     <p:extLst>
       <p:ext uri="{BB962C8B-B14F-4D97-AF65-F5344CB8AC3E}">
-        <p14:creationId xmlns:p14="http://schemas.microsoft.com/office/powerpoint/2010/main" val="2119081702"/>
+        <p14:creationId xmlns:p14="http://schemas.microsoft.com/office/powerpoint/2010/main" val="2903904270"/>
       </p:ext>
     </p:extLst>
   </p:cSld>

</xml_diff>